<commit_message>
Update TNT process map
</commit_message>
<xml_diff>
--- a/Genetic_Capitalism/TNT/TNTFileGenerator/TNT_file_generator.pptx
+++ b/Genetic_Capitalism/TNT/TNTFileGenerator/TNT_file_generator.pptx
@@ -6,6 +6,7 @@
   </p:sldMasterIdLst>
   <p:sldIdLst>
     <p:sldId id="257" r:id="rId2"/>
+    <p:sldId id="258" r:id="rId3"/>
   </p:sldIdLst>
   <p:sldSz cx="12192000" cy="6858000"/>
   <p:notesSz cx="6858000" cy="9144000"/>
@@ -104,6 +105,11 @@
       </a:defRPr>
     </a:lvl9pPr>
   </p:defaultTextStyle>
+  <p:extLst>
+    <p:ext uri="{EFAFB233-063F-42B5-8137-9DF3F51BA10A}">
+      <p15:sldGuideLst xmlns:p15="http://schemas.microsoft.com/office/powerpoint/2012/main"/>
+    </p:ext>
+  </p:extLst>
 </p:presentation>
 </file>
 
@@ -254,7 +260,7 @@
           <a:p>
             <a:fld id="{7A7F6C22-B508-9741-95E4-E1F81330A3BC}" type="datetimeFigureOut">
               <a:rPr lang="en-US" smtClean="0"/>
-              <a:t>12/18/18</a:t>
+              <a:t>1/7/2020</a:t>
             </a:fld>
             <a:endParaRPr lang="en-US"/>
           </a:p>
@@ -452,7 +458,7 @@
           <a:p>
             <a:fld id="{7A7F6C22-B508-9741-95E4-E1F81330A3BC}" type="datetimeFigureOut">
               <a:rPr lang="en-US" smtClean="0"/>
-              <a:t>12/18/18</a:t>
+              <a:t>1/7/2020</a:t>
             </a:fld>
             <a:endParaRPr lang="en-US"/>
           </a:p>
@@ -660,7 +666,7 @@
           <a:p>
             <a:fld id="{7A7F6C22-B508-9741-95E4-E1F81330A3BC}" type="datetimeFigureOut">
               <a:rPr lang="en-US" smtClean="0"/>
-              <a:t>12/18/18</a:t>
+              <a:t>1/7/2020</a:t>
             </a:fld>
             <a:endParaRPr lang="en-US"/>
           </a:p>
@@ -858,7 +864,7 @@
           <a:p>
             <a:fld id="{7A7F6C22-B508-9741-95E4-E1F81330A3BC}" type="datetimeFigureOut">
               <a:rPr lang="en-US" smtClean="0"/>
-              <a:t>12/18/18</a:t>
+              <a:t>1/7/2020</a:t>
             </a:fld>
             <a:endParaRPr lang="en-US"/>
           </a:p>
@@ -1133,7 +1139,7 @@
           <a:p>
             <a:fld id="{7A7F6C22-B508-9741-95E4-E1F81330A3BC}" type="datetimeFigureOut">
               <a:rPr lang="en-US" smtClean="0"/>
-              <a:t>12/18/18</a:t>
+              <a:t>1/7/2020</a:t>
             </a:fld>
             <a:endParaRPr lang="en-US"/>
           </a:p>
@@ -1398,7 +1404,7 @@
           <a:p>
             <a:fld id="{7A7F6C22-B508-9741-95E4-E1F81330A3BC}" type="datetimeFigureOut">
               <a:rPr lang="en-US" smtClean="0"/>
-              <a:t>12/18/18</a:t>
+              <a:t>1/7/2020</a:t>
             </a:fld>
             <a:endParaRPr lang="en-US"/>
           </a:p>
@@ -1810,7 +1816,7 @@
           <a:p>
             <a:fld id="{7A7F6C22-B508-9741-95E4-E1F81330A3BC}" type="datetimeFigureOut">
               <a:rPr lang="en-US" smtClean="0"/>
-              <a:t>12/18/18</a:t>
+              <a:t>1/7/2020</a:t>
             </a:fld>
             <a:endParaRPr lang="en-US"/>
           </a:p>
@@ -1951,7 +1957,7 @@
           <a:p>
             <a:fld id="{7A7F6C22-B508-9741-95E4-E1F81330A3BC}" type="datetimeFigureOut">
               <a:rPr lang="en-US" smtClean="0"/>
-              <a:t>12/18/18</a:t>
+              <a:t>1/7/2020</a:t>
             </a:fld>
             <a:endParaRPr lang="en-US"/>
           </a:p>
@@ -2064,7 +2070,7 @@
           <a:p>
             <a:fld id="{7A7F6C22-B508-9741-95E4-E1F81330A3BC}" type="datetimeFigureOut">
               <a:rPr lang="en-US" smtClean="0"/>
-              <a:t>12/18/18</a:t>
+              <a:t>1/7/2020</a:t>
             </a:fld>
             <a:endParaRPr lang="en-US"/>
           </a:p>
@@ -2375,7 +2381,7 @@
           <a:p>
             <a:fld id="{7A7F6C22-B508-9741-95E4-E1F81330A3BC}" type="datetimeFigureOut">
               <a:rPr lang="en-US" smtClean="0"/>
-              <a:t>12/18/18</a:t>
+              <a:t>1/7/2020</a:t>
             </a:fld>
             <a:endParaRPr lang="en-US"/>
           </a:p>
@@ -2663,7 +2669,7 @@
           <a:p>
             <a:fld id="{7A7F6C22-B508-9741-95E4-E1F81330A3BC}" type="datetimeFigureOut">
               <a:rPr lang="en-US" smtClean="0"/>
-              <a:t>12/18/18</a:t>
+              <a:t>1/7/2020</a:t>
             </a:fld>
             <a:endParaRPr lang="en-US"/>
           </a:p>
@@ -2904,7 +2910,7 @@
           <a:p>
             <a:fld id="{7A7F6C22-B508-9741-95E4-E1F81330A3BC}" type="datetimeFigureOut">
               <a:rPr lang="en-US" smtClean="0"/>
-              <a:t>12/18/18</a:t>
+              <a:t>1/7/2020</a:t>
             </a:fld>
             <a:endParaRPr lang="en-US"/>
           </a:p>
@@ -5402,6 +5408,2176 @@
     <p:extLst>
       <p:ext uri="{BB962C8B-B14F-4D97-AF65-F5344CB8AC3E}">
         <p14:creationId xmlns:p14="http://schemas.microsoft.com/office/powerpoint/2010/main" val="2125762750"/>
+      </p:ext>
+    </p:extLst>
+  </p:cSld>
+  <p:clrMapOvr>
+    <a:masterClrMapping/>
+  </p:clrMapOvr>
+</p:sld>
+</file>
+
+<file path=ppt/slides/slide2.xml><?xml version="1.0" encoding="utf-8"?>
+<p:sld xmlns:a="http://schemas.openxmlformats.org/drawingml/2006/main" xmlns:r="http://schemas.openxmlformats.org/officeDocument/2006/relationships" xmlns:p="http://schemas.openxmlformats.org/presentationml/2006/main">
+  <p:cSld>
+    <p:spTree>
+      <p:nvGrpSpPr>
+        <p:cNvPr id="1" name=""/>
+        <p:cNvGrpSpPr/>
+        <p:nvPr/>
+      </p:nvGrpSpPr>
+      <p:grpSpPr>
+        <a:xfrm>
+          <a:off x="0" y="0"/>
+          <a:ext cx="0" cy="0"/>
+          <a:chOff x="0" y="0"/>
+          <a:chExt cx="0" cy="0"/>
+        </a:xfrm>
+      </p:grpSpPr>
+      <p:sp>
+        <p:nvSpPr>
+          <p:cNvPr id="2" name="Can 1">
+            <a:extLst>
+              <a:ext uri="{FF2B5EF4-FFF2-40B4-BE49-F238E27FC236}">
+                <a16:creationId xmlns:a16="http://schemas.microsoft.com/office/drawing/2014/main" id="{DD0E5CC1-A6A0-5445-BB84-8E676D1748E1}"/>
+              </a:ext>
+            </a:extLst>
+          </p:cNvPr>
+          <p:cNvSpPr/>
+          <p:nvPr/>
+        </p:nvSpPr>
+        <p:spPr>
+          <a:xfrm>
+            <a:off x="1475138" y="961345"/>
+            <a:ext cx="1372837" cy="1353230"/>
+          </a:xfrm>
+          <a:prstGeom prst="can">
+            <a:avLst/>
+          </a:prstGeom>
+          <a:noFill/>
+          <a:ln>
+            <a:solidFill>
+              <a:schemeClr val="tx1"/>
+            </a:solidFill>
+          </a:ln>
+        </p:spPr>
+        <p:style>
+          <a:lnRef idx="2">
+            <a:schemeClr val="accent1">
+              <a:shade val="50000"/>
+            </a:schemeClr>
+          </a:lnRef>
+          <a:fillRef idx="1">
+            <a:schemeClr val="accent1"/>
+          </a:fillRef>
+          <a:effectRef idx="0">
+            <a:schemeClr val="accent1"/>
+          </a:effectRef>
+          <a:fontRef idx="minor">
+            <a:schemeClr val="lt1"/>
+          </a:fontRef>
+        </p:style>
+        <p:txBody>
+          <a:bodyPr rtlCol="0" anchor="ctr"/>
+          <a:lstStyle/>
+          <a:p>
+            <a:pPr algn="ctr"/>
+            <a:r>
+              <a:rPr lang="en-US" dirty="0">
+                <a:solidFill>
+                  <a:schemeClr val="tx1"/>
+                </a:solidFill>
+              </a:rPr>
+              <a:t>NCBI</a:t>
+            </a:r>
+          </a:p>
+          <a:p>
+            <a:pPr algn="ctr"/>
+            <a:r>
+              <a:rPr lang="en-US" dirty="0">
+                <a:solidFill>
+                  <a:schemeClr val="tx1"/>
+                </a:solidFill>
+              </a:rPr>
+              <a:t>Pathogen</a:t>
+            </a:r>
+          </a:p>
+          <a:p>
+            <a:pPr algn="ctr"/>
+            <a:r>
+              <a:rPr lang="en-US" dirty="0">
+                <a:solidFill>
+                  <a:schemeClr val="tx1"/>
+                </a:solidFill>
+              </a:rPr>
+              <a:t>FTP</a:t>
+            </a:r>
+          </a:p>
+        </p:txBody>
+      </p:sp>
+      <p:sp>
+        <p:nvSpPr>
+          <p:cNvPr id="3" name="Can 2">
+            <a:extLst>
+              <a:ext uri="{FF2B5EF4-FFF2-40B4-BE49-F238E27FC236}">
+                <a16:creationId xmlns:a16="http://schemas.microsoft.com/office/drawing/2014/main" id="{02B9FDD3-9B95-804D-BFD4-1B60B302F179}"/>
+              </a:ext>
+            </a:extLst>
+          </p:cNvPr>
+          <p:cNvSpPr/>
+          <p:nvPr/>
+        </p:nvSpPr>
+        <p:spPr>
+          <a:xfrm>
+            <a:off x="9052200" y="3789366"/>
+            <a:ext cx="1372837" cy="1353230"/>
+          </a:xfrm>
+          <a:prstGeom prst="can">
+            <a:avLst/>
+          </a:prstGeom>
+          <a:noFill/>
+          <a:ln>
+            <a:solidFill>
+              <a:schemeClr val="tx1"/>
+            </a:solidFill>
+          </a:ln>
+        </p:spPr>
+        <p:style>
+          <a:lnRef idx="2">
+            <a:schemeClr val="accent1">
+              <a:shade val="50000"/>
+            </a:schemeClr>
+          </a:lnRef>
+          <a:fillRef idx="1">
+            <a:schemeClr val="accent1"/>
+          </a:fillRef>
+          <a:effectRef idx="0">
+            <a:schemeClr val="accent1"/>
+          </a:effectRef>
+          <a:fontRef idx="minor">
+            <a:schemeClr val="lt1"/>
+          </a:fontRef>
+        </p:style>
+        <p:txBody>
+          <a:bodyPr rtlCol="0" anchor="ctr"/>
+          <a:lstStyle/>
+          <a:p>
+            <a:pPr algn="ctr"/>
+            <a:r>
+              <a:rPr lang="en-US" dirty="0">
+                <a:solidFill>
+                  <a:schemeClr val="tx1"/>
+                </a:solidFill>
+              </a:rPr>
+              <a:t>NCBI</a:t>
+            </a:r>
+          </a:p>
+          <a:p>
+            <a:pPr algn="ctr"/>
+            <a:r>
+              <a:rPr lang="en-US" dirty="0">
+                <a:solidFill>
+                  <a:schemeClr val="tx1"/>
+                </a:solidFill>
+              </a:rPr>
+              <a:t>Pathogen</a:t>
+            </a:r>
+          </a:p>
+          <a:p>
+            <a:pPr algn="ctr"/>
+            <a:r>
+              <a:rPr lang="en-US" dirty="0">
+                <a:solidFill>
+                  <a:schemeClr val="tx1"/>
+                </a:solidFill>
+              </a:rPr>
+              <a:t>Isolates DB</a:t>
+            </a:r>
+          </a:p>
+        </p:txBody>
+      </p:sp>
+      <p:sp>
+        <p:nvSpPr>
+          <p:cNvPr id="4" name="Document 3">
+            <a:extLst>
+              <a:ext uri="{FF2B5EF4-FFF2-40B4-BE49-F238E27FC236}">
+                <a16:creationId xmlns:a16="http://schemas.microsoft.com/office/drawing/2014/main" id="{45EB6978-7A20-A145-BCD1-E4267E8D8E8F}"/>
+              </a:ext>
+            </a:extLst>
+          </p:cNvPr>
+          <p:cNvSpPr/>
+          <p:nvPr/>
+        </p:nvSpPr>
+        <p:spPr>
+          <a:xfrm>
+            <a:off x="3345037" y="1227033"/>
+            <a:ext cx="1019175" cy="841248"/>
+          </a:xfrm>
+          <a:prstGeom prst="flowChartDocument">
+            <a:avLst/>
+          </a:prstGeom>
+          <a:noFill/>
+          <a:ln>
+            <a:solidFill>
+              <a:schemeClr val="tx1"/>
+            </a:solidFill>
+          </a:ln>
+        </p:spPr>
+        <p:style>
+          <a:lnRef idx="2">
+            <a:schemeClr val="accent1">
+              <a:shade val="50000"/>
+            </a:schemeClr>
+          </a:lnRef>
+          <a:fillRef idx="1">
+            <a:schemeClr val="accent1"/>
+          </a:fillRef>
+          <a:effectRef idx="0">
+            <a:schemeClr val="accent1"/>
+          </a:effectRef>
+          <a:fontRef idx="minor">
+            <a:schemeClr val="lt1"/>
+          </a:fontRef>
+        </p:style>
+        <p:txBody>
+          <a:bodyPr rot="0" spcFirstLastPara="0" vertOverflow="overflow" horzOverflow="overflow" vert="horz" wrap="square" lIns="91440" tIns="45720" rIns="91440" bIns="45720" numCol="1" spcCol="0" rtlCol="0" fromWordArt="0" anchor="ctr" anchorCtr="0" forceAA="0" compatLnSpc="1">
+            <a:prstTxWarp prst="textNoShape">
+              <a:avLst/>
+            </a:prstTxWarp>
+            <a:noAutofit/>
+          </a:bodyPr>
+          <a:lstStyle/>
+          <a:p>
+            <a:pPr algn="ctr"/>
+            <a:r>
+              <a:rPr lang="en-US" dirty="0" err="1">
+                <a:solidFill>
+                  <a:schemeClr val="tx1"/>
+                </a:solidFill>
+              </a:rPr>
+              <a:t>Newick</a:t>
+            </a:r>
+            <a:r>
+              <a:rPr lang="en-US" dirty="0">
+                <a:solidFill>
+                  <a:schemeClr val="tx1"/>
+                </a:solidFill>
+              </a:rPr>
+              <a:t> Tree</a:t>
+            </a:r>
+          </a:p>
+        </p:txBody>
+      </p:sp>
+      <p:cxnSp>
+        <p:nvCxnSpPr>
+          <p:cNvPr id="12" name="Straight Arrow Connector 11">
+            <a:extLst>
+              <a:ext uri="{FF2B5EF4-FFF2-40B4-BE49-F238E27FC236}">
+                <a16:creationId xmlns:a16="http://schemas.microsoft.com/office/drawing/2014/main" id="{A8C369EF-659B-8D42-BBBE-E0983B7520AF}"/>
+              </a:ext>
+            </a:extLst>
+          </p:cNvPr>
+          <p:cNvCxnSpPr>
+            <a:cxnSpLocks/>
+            <a:stCxn id="2" idx="4"/>
+          </p:cNvCxnSpPr>
+          <p:nvPr/>
+        </p:nvCxnSpPr>
+        <p:spPr>
+          <a:xfrm>
+            <a:off x="2847975" y="1637960"/>
+            <a:ext cx="509587" cy="0"/>
+          </a:xfrm>
+          <a:prstGeom prst="straightConnector1">
+            <a:avLst/>
+          </a:prstGeom>
+          <a:ln w="19050">
+            <a:solidFill>
+              <a:schemeClr val="tx1"/>
+            </a:solidFill>
+            <a:prstDash val="dash"/>
+            <a:headEnd type="diamond"/>
+            <a:tailEnd type="triangle"/>
+          </a:ln>
+        </p:spPr>
+        <p:style>
+          <a:lnRef idx="1">
+            <a:schemeClr val="accent1"/>
+          </a:lnRef>
+          <a:fillRef idx="0">
+            <a:schemeClr val="accent1"/>
+          </a:fillRef>
+          <a:effectRef idx="0">
+            <a:schemeClr val="accent1"/>
+          </a:effectRef>
+          <a:fontRef idx="minor">
+            <a:schemeClr val="tx1"/>
+          </a:fontRef>
+        </p:style>
+      </p:cxnSp>
+      <p:sp>
+        <p:nvSpPr>
+          <p:cNvPr id="13" name="Can 12">
+            <a:extLst>
+              <a:ext uri="{FF2B5EF4-FFF2-40B4-BE49-F238E27FC236}">
+                <a16:creationId xmlns:a16="http://schemas.microsoft.com/office/drawing/2014/main" id="{D9E70898-ED86-DE42-A8F8-FE003872083B}"/>
+              </a:ext>
+            </a:extLst>
+          </p:cNvPr>
+          <p:cNvSpPr/>
+          <p:nvPr/>
+        </p:nvSpPr>
+        <p:spPr>
+          <a:xfrm>
+            <a:off x="174966" y="5915024"/>
+            <a:ext cx="1372837" cy="638175"/>
+          </a:xfrm>
+          <a:prstGeom prst="can">
+            <a:avLst/>
+          </a:prstGeom>
+          <a:noFill/>
+          <a:ln>
+            <a:solidFill>
+              <a:schemeClr val="tx1"/>
+            </a:solidFill>
+          </a:ln>
+        </p:spPr>
+        <p:style>
+          <a:lnRef idx="2">
+            <a:schemeClr val="accent1">
+              <a:shade val="50000"/>
+            </a:schemeClr>
+          </a:lnRef>
+          <a:fillRef idx="1">
+            <a:schemeClr val="accent1"/>
+          </a:fillRef>
+          <a:effectRef idx="0">
+            <a:schemeClr val="accent1"/>
+          </a:effectRef>
+          <a:fontRef idx="minor">
+            <a:schemeClr val="lt1"/>
+          </a:fontRef>
+        </p:style>
+        <p:txBody>
+          <a:bodyPr rtlCol="0" anchor="ctr"/>
+          <a:lstStyle/>
+          <a:p>
+            <a:pPr algn="ctr"/>
+            <a:r>
+              <a:rPr lang="en-US" dirty="0">
+                <a:solidFill>
+                  <a:schemeClr val="tx1"/>
+                </a:solidFill>
+              </a:rPr>
+              <a:t>Repository</a:t>
+            </a:r>
+          </a:p>
+        </p:txBody>
+      </p:sp>
+      <p:sp>
+        <p:nvSpPr>
+          <p:cNvPr id="14" name="Document 13">
+            <a:extLst>
+              <a:ext uri="{FF2B5EF4-FFF2-40B4-BE49-F238E27FC236}">
+                <a16:creationId xmlns:a16="http://schemas.microsoft.com/office/drawing/2014/main" id="{928FECC0-A085-2E4D-AA67-261DA839ED7B}"/>
+              </a:ext>
+            </a:extLst>
+          </p:cNvPr>
+          <p:cNvSpPr/>
+          <p:nvPr/>
+        </p:nvSpPr>
+        <p:spPr>
+          <a:xfrm>
+            <a:off x="1719254" y="5915023"/>
+            <a:ext cx="711976" cy="638175"/>
+          </a:xfrm>
+          <a:prstGeom prst="flowChartDocument">
+            <a:avLst/>
+          </a:prstGeom>
+          <a:noFill/>
+          <a:ln>
+            <a:solidFill>
+              <a:schemeClr val="tx1"/>
+            </a:solidFill>
+          </a:ln>
+        </p:spPr>
+        <p:style>
+          <a:lnRef idx="2">
+            <a:schemeClr val="accent1">
+              <a:shade val="50000"/>
+            </a:schemeClr>
+          </a:lnRef>
+          <a:fillRef idx="1">
+            <a:schemeClr val="accent1"/>
+          </a:fillRef>
+          <a:effectRef idx="0">
+            <a:schemeClr val="accent1"/>
+          </a:effectRef>
+          <a:fontRef idx="minor">
+            <a:schemeClr val="lt1"/>
+          </a:fontRef>
+        </p:style>
+        <p:txBody>
+          <a:bodyPr rot="0" spcFirstLastPara="0" vertOverflow="overflow" horzOverflow="overflow" vert="horz" wrap="square" lIns="91440" tIns="45720" rIns="91440" bIns="45720" numCol="1" spcCol="0" rtlCol="0" fromWordArt="0" anchor="ctr" anchorCtr="0" forceAA="0" compatLnSpc="1">
+            <a:prstTxWarp prst="textNoShape">
+              <a:avLst/>
+            </a:prstTxWarp>
+            <a:noAutofit/>
+          </a:bodyPr>
+          <a:lstStyle/>
+          <a:p>
+            <a:pPr algn="ctr"/>
+            <a:r>
+              <a:rPr lang="en-US" dirty="0">
+                <a:solidFill>
+                  <a:schemeClr val="tx1"/>
+                </a:solidFill>
+              </a:rPr>
+              <a:t>File</a:t>
+            </a:r>
+          </a:p>
+        </p:txBody>
+      </p:sp>
+      <p:cxnSp>
+        <p:nvCxnSpPr>
+          <p:cNvPr id="15" name="Straight Arrow Connector 14">
+            <a:extLst>
+              <a:ext uri="{FF2B5EF4-FFF2-40B4-BE49-F238E27FC236}">
+                <a16:creationId xmlns:a16="http://schemas.microsoft.com/office/drawing/2014/main" id="{21BA6AA5-B11C-E742-B905-CA87B34E68C1}"/>
+              </a:ext>
+            </a:extLst>
+          </p:cNvPr>
+          <p:cNvCxnSpPr>
+            <a:cxnSpLocks/>
+          </p:cNvCxnSpPr>
+          <p:nvPr/>
+        </p:nvCxnSpPr>
+        <p:spPr>
+          <a:xfrm>
+            <a:off x="2653385" y="6381429"/>
+            <a:ext cx="911211" cy="0"/>
+          </a:xfrm>
+          <a:prstGeom prst="straightConnector1">
+            <a:avLst/>
+          </a:prstGeom>
+          <a:ln w="19050">
+            <a:solidFill>
+              <a:schemeClr val="tx1"/>
+            </a:solidFill>
+            <a:prstDash val="dash"/>
+            <a:headEnd type="diamond"/>
+            <a:tailEnd type="triangle"/>
+          </a:ln>
+        </p:spPr>
+        <p:style>
+          <a:lnRef idx="1">
+            <a:schemeClr val="accent1"/>
+          </a:lnRef>
+          <a:fillRef idx="0">
+            <a:schemeClr val="accent1"/>
+          </a:fillRef>
+          <a:effectRef idx="0">
+            <a:schemeClr val="accent1"/>
+          </a:effectRef>
+          <a:fontRef idx="minor">
+            <a:schemeClr val="tx1"/>
+          </a:fontRef>
+        </p:style>
+      </p:cxnSp>
+      <p:sp>
+        <p:nvSpPr>
+          <p:cNvPr id="16" name="TextBox 15">
+            <a:extLst>
+              <a:ext uri="{FF2B5EF4-FFF2-40B4-BE49-F238E27FC236}">
+                <a16:creationId xmlns:a16="http://schemas.microsoft.com/office/drawing/2014/main" id="{05883D8F-1805-1F4A-BA45-67D7049E89D3}"/>
+              </a:ext>
+            </a:extLst>
+          </p:cNvPr>
+          <p:cNvSpPr txBox="1"/>
+          <p:nvPr/>
+        </p:nvSpPr>
+        <p:spPr>
+          <a:xfrm>
+            <a:off x="2653386" y="5954945"/>
+            <a:ext cx="911211" cy="369332"/>
+          </a:xfrm>
+          <a:prstGeom prst="rect">
+            <a:avLst/>
+          </a:prstGeom>
+          <a:noFill/>
+        </p:spPr>
+        <p:txBody>
+          <a:bodyPr wrap="none" rtlCol="0">
+            <a:spAutoFit/>
+          </a:bodyPr>
+          <a:lstStyle/>
+          <a:p>
+            <a:pPr algn="l"/>
+            <a:r>
+              <a:rPr lang="en-US" dirty="0"/>
+              <a:t>FTP Get</a:t>
+            </a:r>
+          </a:p>
+        </p:txBody>
+      </p:sp>
+      <p:sp>
+        <p:nvSpPr>
+          <p:cNvPr id="17" name="Chevron 16">
+            <a:extLst>
+              <a:ext uri="{FF2B5EF4-FFF2-40B4-BE49-F238E27FC236}">
+                <a16:creationId xmlns:a16="http://schemas.microsoft.com/office/drawing/2014/main" id="{7A6C87B5-5F1C-8343-A3B6-7B7CBA7BE44B}"/>
+              </a:ext>
+            </a:extLst>
+          </p:cNvPr>
+          <p:cNvSpPr/>
+          <p:nvPr/>
+        </p:nvSpPr>
+        <p:spPr>
+          <a:xfrm>
+            <a:off x="4626936" y="1103886"/>
+            <a:ext cx="2212632" cy="1087541"/>
+          </a:xfrm>
+          <a:prstGeom prst="chevron">
+            <a:avLst/>
+          </a:prstGeom>
+          <a:noFill/>
+          <a:ln>
+            <a:solidFill>
+              <a:schemeClr val="tx1"/>
+            </a:solidFill>
+          </a:ln>
+        </p:spPr>
+        <p:style>
+          <a:lnRef idx="2">
+            <a:schemeClr val="accent1">
+              <a:shade val="50000"/>
+            </a:schemeClr>
+          </a:lnRef>
+          <a:fillRef idx="1">
+            <a:schemeClr val="accent1"/>
+          </a:fillRef>
+          <a:effectRef idx="0">
+            <a:schemeClr val="accent1"/>
+          </a:effectRef>
+          <a:fontRef idx="minor">
+            <a:schemeClr val="lt1"/>
+          </a:fontRef>
+        </p:style>
+        <p:txBody>
+          <a:bodyPr rot="0" spcFirstLastPara="0" vertOverflow="overflow" horzOverflow="overflow" vert="horz" wrap="square" lIns="91440" tIns="45720" rIns="91440" bIns="45720" numCol="1" spcCol="0" rtlCol="0" fromWordArt="0" anchor="ctr" anchorCtr="0" forceAA="0" compatLnSpc="1">
+            <a:prstTxWarp prst="textNoShape">
+              <a:avLst/>
+            </a:prstTxWarp>
+            <a:noAutofit/>
+          </a:bodyPr>
+          <a:lstStyle/>
+          <a:p>
+            <a:pPr algn="ctr"/>
+            <a:r>
+              <a:rPr lang="en-US" dirty="0">
+                <a:solidFill>
+                  <a:schemeClr val="tx1"/>
+                </a:solidFill>
+              </a:rPr>
+              <a:t>Strip Distances and Commas</a:t>
+            </a:r>
+          </a:p>
+        </p:txBody>
+      </p:sp>
+      <p:sp>
+        <p:nvSpPr>
+          <p:cNvPr id="18" name="Chevron 17">
+            <a:extLst>
+              <a:ext uri="{FF2B5EF4-FFF2-40B4-BE49-F238E27FC236}">
+                <a16:creationId xmlns:a16="http://schemas.microsoft.com/office/drawing/2014/main" id="{4B6AB692-D176-6949-9248-AA0694BC1924}"/>
+              </a:ext>
+            </a:extLst>
+          </p:cNvPr>
+          <p:cNvSpPr/>
+          <p:nvPr/>
+        </p:nvSpPr>
+        <p:spPr>
+          <a:xfrm>
+            <a:off x="3743626" y="5915023"/>
+            <a:ext cx="1337447" cy="638175"/>
+          </a:xfrm>
+          <a:prstGeom prst="chevron">
+            <a:avLst/>
+          </a:prstGeom>
+          <a:noFill/>
+          <a:ln>
+            <a:solidFill>
+              <a:schemeClr val="tx1"/>
+            </a:solidFill>
+          </a:ln>
+        </p:spPr>
+        <p:style>
+          <a:lnRef idx="2">
+            <a:schemeClr val="accent1">
+              <a:shade val="50000"/>
+            </a:schemeClr>
+          </a:lnRef>
+          <a:fillRef idx="1">
+            <a:schemeClr val="accent1"/>
+          </a:fillRef>
+          <a:effectRef idx="0">
+            <a:schemeClr val="accent1"/>
+          </a:effectRef>
+          <a:fontRef idx="minor">
+            <a:schemeClr val="lt1"/>
+          </a:fontRef>
+        </p:style>
+        <p:txBody>
+          <a:bodyPr rot="0" spcFirstLastPara="0" vertOverflow="overflow" horzOverflow="overflow" vert="horz" wrap="square" lIns="91440" tIns="45720" rIns="91440" bIns="45720" numCol="1" spcCol="0" rtlCol="0" fromWordArt="0" anchor="ctr" anchorCtr="0" forceAA="0" compatLnSpc="1">
+            <a:prstTxWarp prst="textNoShape">
+              <a:avLst/>
+            </a:prstTxWarp>
+            <a:noAutofit/>
+          </a:bodyPr>
+          <a:lstStyle/>
+          <a:p>
+            <a:pPr algn="ctr"/>
+            <a:r>
+              <a:rPr lang="en-US" dirty="0">
+                <a:solidFill>
+                  <a:schemeClr val="tx1"/>
+                </a:solidFill>
+              </a:rPr>
+              <a:t>Filter</a:t>
+            </a:r>
+          </a:p>
+        </p:txBody>
+      </p:sp>
+      <p:sp>
+        <p:nvSpPr>
+          <p:cNvPr id="19" name="Chevron 18">
+            <a:extLst>
+              <a:ext uri="{FF2B5EF4-FFF2-40B4-BE49-F238E27FC236}">
+                <a16:creationId xmlns:a16="http://schemas.microsoft.com/office/drawing/2014/main" id="{393A0CF6-FDC5-4942-8970-4DA1FC3FB9D9}"/>
+              </a:ext>
+            </a:extLst>
+          </p:cNvPr>
+          <p:cNvSpPr/>
+          <p:nvPr/>
+        </p:nvSpPr>
+        <p:spPr>
+          <a:xfrm>
+            <a:off x="6839568" y="1103886"/>
+            <a:ext cx="2212632" cy="1087541"/>
+          </a:xfrm>
+          <a:prstGeom prst="chevron">
+            <a:avLst/>
+          </a:prstGeom>
+          <a:noFill/>
+          <a:ln>
+            <a:solidFill>
+              <a:schemeClr val="tx1"/>
+            </a:solidFill>
+          </a:ln>
+        </p:spPr>
+        <p:style>
+          <a:lnRef idx="2">
+            <a:schemeClr val="accent1">
+              <a:shade val="50000"/>
+            </a:schemeClr>
+          </a:lnRef>
+          <a:fillRef idx="1">
+            <a:schemeClr val="accent1"/>
+          </a:fillRef>
+          <a:effectRef idx="0">
+            <a:schemeClr val="accent1"/>
+          </a:effectRef>
+          <a:fontRef idx="minor">
+            <a:schemeClr val="lt1"/>
+          </a:fontRef>
+        </p:style>
+        <p:txBody>
+          <a:bodyPr rot="0" spcFirstLastPara="0" vertOverflow="overflow" horzOverflow="overflow" vert="horz" wrap="square" lIns="91440" tIns="45720" rIns="91440" bIns="45720" numCol="1" spcCol="0" rtlCol="0" fromWordArt="0" anchor="ctr" anchorCtr="0" forceAA="0" compatLnSpc="1">
+            <a:prstTxWarp prst="textNoShape">
+              <a:avLst/>
+            </a:prstTxWarp>
+            <a:noAutofit/>
+          </a:bodyPr>
+          <a:lstStyle/>
+          <a:p>
+            <a:pPr algn="ctr"/>
+            <a:r>
+              <a:rPr lang="en-US" dirty="0">
+                <a:solidFill>
+                  <a:schemeClr val="tx1"/>
+                </a:solidFill>
+              </a:rPr>
+              <a:t>Collect Accession IDs</a:t>
+            </a:r>
+          </a:p>
+        </p:txBody>
+      </p:sp>
+      <p:cxnSp>
+        <p:nvCxnSpPr>
+          <p:cNvPr id="26" name="Straight Arrow Connector 25">
+            <a:extLst>
+              <a:ext uri="{FF2B5EF4-FFF2-40B4-BE49-F238E27FC236}">
+                <a16:creationId xmlns:a16="http://schemas.microsoft.com/office/drawing/2014/main" id="{E5406090-9823-4D47-992E-16ED5C30D8A5}"/>
+              </a:ext>
+            </a:extLst>
+          </p:cNvPr>
+          <p:cNvCxnSpPr>
+            <a:cxnSpLocks/>
+            <a:stCxn id="4" idx="3"/>
+            <a:endCxn id="17" idx="1"/>
+          </p:cNvCxnSpPr>
+          <p:nvPr/>
+        </p:nvCxnSpPr>
+        <p:spPr>
+          <a:xfrm>
+            <a:off x="4364212" y="1647657"/>
+            <a:ext cx="806495" cy="0"/>
+          </a:xfrm>
+          <a:prstGeom prst="straightConnector1">
+            <a:avLst/>
+          </a:prstGeom>
+          <a:ln w="19050">
+            <a:solidFill>
+              <a:schemeClr val="tx1"/>
+            </a:solidFill>
+            <a:headEnd type="oval"/>
+            <a:tailEnd type="triangle"/>
+          </a:ln>
+        </p:spPr>
+        <p:style>
+          <a:lnRef idx="1">
+            <a:schemeClr val="accent1"/>
+          </a:lnRef>
+          <a:fillRef idx="0">
+            <a:schemeClr val="accent1"/>
+          </a:fillRef>
+          <a:effectRef idx="0">
+            <a:schemeClr val="accent1"/>
+          </a:effectRef>
+          <a:fontRef idx="minor">
+            <a:schemeClr val="tx1"/>
+          </a:fontRef>
+        </p:style>
+      </p:cxnSp>
+      <p:cxnSp>
+        <p:nvCxnSpPr>
+          <p:cNvPr id="27" name="Straight Arrow Connector 26">
+            <a:extLst>
+              <a:ext uri="{FF2B5EF4-FFF2-40B4-BE49-F238E27FC236}">
+                <a16:creationId xmlns:a16="http://schemas.microsoft.com/office/drawing/2014/main" id="{1E50EEB0-2361-E748-AC84-62895A743551}"/>
+              </a:ext>
+            </a:extLst>
+          </p:cNvPr>
+          <p:cNvCxnSpPr>
+            <a:cxnSpLocks/>
+            <a:stCxn id="17" idx="3"/>
+            <a:endCxn id="19" idx="1"/>
+          </p:cNvCxnSpPr>
+          <p:nvPr/>
+        </p:nvCxnSpPr>
+        <p:spPr>
+          <a:xfrm>
+            <a:off x="6839568" y="1647657"/>
+            <a:ext cx="543771" cy="0"/>
+          </a:xfrm>
+          <a:prstGeom prst="straightConnector1">
+            <a:avLst/>
+          </a:prstGeom>
+          <a:ln w="19050">
+            <a:solidFill>
+              <a:schemeClr val="tx1"/>
+            </a:solidFill>
+            <a:headEnd type="oval"/>
+            <a:tailEnd type="triangle"/>
+          </a:ln>
+        </p:spPr>
+        <p:style>
+          <a:lnRef idx="1">
+            <a:schemeClr val="accent1"/>
+          </a:lnRef>
+          <a:fillRef idx="0">
+            <a:schemeClr val="accent1"/>
+          </a:fillRef>
+          <a:effectRef idx="0">
+            <a:schemeClr val="accent1"/>
+          </a:effectRef>
+          <a:fontRef idx="minor">
+            <a:schemeClr val="tx1"/>
+          </a:fontRef>
+        </p:style>
+      </p:cxnSp>
+      <p:cxnSp>
+        <p:nvCxnSpPr>
+          <p:cNvPr id="35" name="Straight Arrow Connector 34">
+            <a:extLst>
+              <a:ext uri="{FF2B5EF4-FFF2-40B4-BE49-F238E27FC236}">
+                <a16:creationId xmlns:a16="http://schemas.microsoft.com/office/drawing/2014/main" id="{FC9BD540-90E7-D940-8BD0-64CE96C272EB}"/>
+              </a:ext>
+            </a:extLst>
+          </p:cNvPr>
+          <p:cNvCxnSpPr>
+            <a:cxnSpLocks/>
+          </p:cNvCxnSpPr>
+          <p:nvPr/>
+        </p:nvCxnSpPr>
+        <p:spPr>
+          <a:xfrm>
+            <a:off x="5187904" y="6387823"/>
+            <a:ext cx="911044" cy="0"/>
+          </a:xfrm>
+          <a:prstGeom prst="straightConnector1">
+            <a:avLst/>
+          </a:prstGeom>
+          <a:ln w="19050">
+            <a:solidFill>
+              <a:schemeClr val="tx1"/>
+            </a:solidFill>
+            <a:headEnd type="oval"/>
+            <a:tailEnd type="triangle"/>
+          </a:ln>
+        </p:spPr>
+        <p:style>
+          <a:lnRef idx="1">
+            <a:schemeClr val="accent1"/>
+          </a:lnRef>
+          <a:fillRef idx="0">
+            <a:schemeClr val="accent1"/>
+          </a:fillRef>
+          <a:effectRef idx="0">
+            <a:schemeClr val="accent1"/>
+          </a:effectRef>
+          <a:fontRef idx="minor">
+            <a:schemeClr val="tx1"/>
+          </a:fontRef>
+        </p:style>
+      </p:cxnSp>
+      <p:sp>
+        <p:nvSpPr>
+          <p:cNvPr id="37" name="TextBox 36">
+            <a:extLst>
+              <a:ext uri="{FF2B5EF4-FFF2-40B4-BE49-F238E27FC236}">
+                <a16:creationId xmlns:a16="http://schemas.microsoft.com/office/drawing/2014/main" id="{C73767E3-E858-1F46-8BD3-37D1D3503080}"/>
+              </a:ext>
+            </a:extLst>
+          </p:cNvPr>
+          <p:cNvSpPr txBox="1"/>
+          <p:nvPr/>
+        </p:nvSpPr>
+        <p:spPr>
+          <a:xfrm>
+            <a:off x="5346710" y="5961339"/>
+            <a:ext cx="593432" cy="369332"/>
+          </a:xfrm>
+          <a:prstGeom prst="rect">
+            <a:avLst/>
+          </a:prstGeom>
+          <a:noFill/>
+        </p:spPr>
+        <p:txBody>
+          <a:bodyPr wrap="none" rtlCol="0">
+            <a:spAutoFit/>
+          </a:bodyPr>
+          <a:lstStyle/>
+          <a:p>
+            <a:pPr algn="l"/>
+            <a:r>
+              <a:rPr lang="en-US" dirty="0"/>
+              <a:t>Pipe</a:t>
+            </a:r>
+          </a:p>
+        </p:txBody>
+      </p:sp>
+      <p:cxnSp>
+        <p:nvCxnSpPr>
+          <p:cNvPr id="39" name="Straight Arrow Connector 38">
+            <a:extLst>
+              <a:ext uri="{FF2B5EF4-FFF2-40B4-BE49-F238E27FC236}">
+                <a16:creationId xmlns:a16="http://schemas.microsoft.com/office/drawing/2014/main" id="{180B8336-EA85-3F40-AF95-EE3B7CD0D1A3}"/>
+              </a:ext>
+            </a:extLst>
+          </p:cNvPr>
+          <p:cNvCxnSpPr>
+            <a:cxnSpLocks/>
+            <a:stCxn id="17" idx="2"/>
+            <a:endCxn id="40" idx="0"/>
+          </p:cNvCxnSpPr>
+          <p:nvPr/>
+        </p:nvCxnSpPr>
+        <p:spPr>
+          <a:xfrm>
+            <a:off x="5461367" y="2191427"/>
+            <a:ext cx="5372" cy="301953"/>
+          </a:xfrm>
+          <a:prstGeom prst="straightConnector1">
+            <a:avLst/>
+          </a:prstGeom>
+          <a:ln w="19050">
+            <a:solidFill>
+              <a:schemeClr val="tx1"/>
+            </a:solidFill>
+            <a:prstDash val="sysDot"/>
+            <a:headEnd type="diamond"/>
+            <a:tailEnd type="stealth" w="lg" len="lg"/>
+          </a:ln>
+        </p:spPr>
+        <p:style>
+          <a:lnRef idx="1">
+            <a:schemeClr val="accent1"/>
+          </a:lnRef>
+          <a:fillRef idx="0">
+            <a:schemeClr val="accent1"/>
+          </a:fillRef>
+          <a:effectRef idx="0">
+            <a:schemeClr val="accent1"/>
+          </a:effectRef>
+          <a:fontRef idx="minor">
+            <a:schemeClr val="tx1"/>
+          </a:fontRef>
+        </p:style>
+      </p:cxnSp>
+      <p:sp>
+        <p:nvSpPr>
+          <p:cNvPr id="40" name="Document 39">
+            <a:extLst>
+              <a:ext uri="{FF2B5EF4-FFF2-40B4-BE49-F238E27FC236}">
+                <a16:creationId xmlns:a16="http://schemas.microsoft.com/office/drawing/2014/main" id="{6F0A63C6-7AE2-6744-B94E-F201DEF9DF52}"/>
+              </a:ext>
+            </a:extLst>
+          </p:cNvPr>
+          <p:cNvSpPr/>
+          <p:nvPr/>
+        </p:nvSpPr>
+        <p:spPr>
+          <a:xfrm>
+            <a:off x="4957151" y="2493380"/>
+            <a:ext cx="1019175" cy="841248"/>
+          </a:xfrm>
+          <a:prstGeom prst="flowChartDocument">
+            <a:avLst/>
+          </a:prstGeom>
+          <a:noFill/>
+          <a:ln>
+            <a:solidFill>
+              <a:schemeClr val="tx1"/>
+            </a:solidFill>
+          </a:ln>
+        </p:spPr>
+        <p:style>
+          <a:lnRef idx="2">
+            <a:schemeClr val="accent1">
+              <a:shade val="50000"/>
+            </a:schemeClr>
+          </a:lnRef>
+          <a:fillRef idx="1">
+            <a:schemeClr val="accent1"/>
+          </a:fillRef>
+          <a:effectRef idx="0">
+            <a:schemeClr val="accent1"/>
+          </a:effectRef>
+          <a:fontRef idx="minor">
+            <a:schemeClr val="lt1"/>
+          </a:fontRef>
+        </p:style>
+        <p:txBody>
+          <a:bodyPr rot="0" spcFirstLastPara="0" vertOverflow="overflow" horzOverflow="overflow" vert="horz" wrap="square" lIns="91440" tIns="45720" rIns="91440" bIns="45720" numCol="1" spcCol="0" rtlCol="0" fromWordArt="0" anchor="ctr" anchorCtr="0" forceAA="0" compatLnSpc="1">
+            <a:prstTxWarp prst="textNoShape">
+              <a:avLst/>
+            </a:prstTxWarp>
+            <a:noAutofit/>
+          </a:bodyPr>
+          <a:lstStyle/>
+          <a:p>
+            <a:pPr algn="ctr"/>
+            <a:r>
+              <a:rPr lang="en-US" dirty="0">
+                <a:solidFill>
+                  <a:schemeClr val="tx1"/>
+                </a:solidFill>
+              </a:rPr>
+              <a:t>TNT File</a:t>
+            </a:r>
+          </a:p>
+        </p:txBody>
+      </p:sp>
+      <p:cxnSp>
+        <p:nvCxnSpPr>
+          <p:cNvPr id="45" name="Straight Arrow Connector 44">
+            <a:extLst>
+              <a:ext uri="{FF2B5EF4-FFF2-40B4-BE49-F238E27FC236}">
+                <a16:creationId xmlns:a16="http://schemas.microsoft.com/office/drawing/2014/main" id="{EE30E3DF-38F6-204E-B850-A1633C8EC2CC}"/>
+              </a:ext>
+            </a:extLst>
+          </p:cNvPr>
+          <p:cNvCxnSpPr>
+            <a:cxnSpLocks/>
+          </p:cNvCxnSpPr>
+          <p:nvPr/>
+        </p:nvCxnSpPr>
+        <p:spPr>
+          <a:xfrm flipV="1">
+            <a:off x="6269768" y="6389132"/>
+            <a:ext cx="899487" cy="1"/>
+          </a:xfrm>
+          <a:prstGeom prst="straightConnector1">
+            <a:avLst/>
+          </a:prstGeom>
+          <a:ln w="19050">
+            <a:solidFill>
+              <a:schemeClr val="tx1"/>
+            </a:solidFill>
+            <a:prstDash val="sysDot"/>
+            <a:headEnd type="diamond"/>
+            <a:tailEnd type="stealth" w="lg" len="lg"/>
+          </a:ln>
+        </p:spPr>
+        <p:style>
+          <a:lnRef idx="1">
+            <a:schemeClr val="accent1"/>
+          </a:lnRef>
+          <a:fillRef idx="0">
+            <a:schemeClr val="accent1"/>
+          </a:fillRef>
+          <a:effectRef idx="0">
+            <a:schemeClr val="accent1"/>
+          </a:effectRef>
+          <a:fontRef idx="minor">
+            <a:schemeClr val="tx1"/>
+          </a:fontRef>
+        </p:style>
+      </p:cxnSp>
+      <p:sp>
+        <p:nvSpPr>
+          <p:cNvPr id="48" name="TextBox 47">
+            <a:extLst>
+              <a:ext uri="{FF2B5EF4-FFF2-40B4-BE49-F238E27FC236}">
+                <a16:creationId xmlns:a16="http://schemas.microsoft.com/office/drawing/2014/main" id="{9E5F7ECC-CAC5-F741-94DA-89EDE8515DAD}"/>
+              </a:ext>
+            </a:extLst>
+          </p:cNvPr>
+          <p:cNvSpPr txBox="1"/>
+          <p:nvPr/>
+        </p:nvSpPr>
+        <p:spPr>
+          <a:xfrm>
+            <a:off x="6176542" y="5962648"/>
+            <a:ext cx="1085938" cy="369332"/>
+          </a:xfrm>
+          <a:prstGeom prst="rect">
+            <a:avLst/>
+          </a:prstGeom>
+          <a:noFill/>
+        </p:spPr>
+        <p:txBody>
+          <a:bodyPr wrap="none" rtlCol="0">
+            <a:spAutoFit/>
+          </a:bodyPr>
+          <a:lstStyle/>
+          <a:p>
+            <a:pPr algn="l"/>
+            <a:r>
+              <a:rPr lang="en-US" dirty="0"/>
+              <a:t>File Write</a:t>
+            </a:r>
+          </a:p>
+        </p:txBody>
+      </p:sp>
+      <p:sp>
+        <p:nvSpPr>
+          <p:cNvPr id="49" name="Document 48">
+            <a:extLst>
+              <a:ext uri="{FF2B5EF4-FFF2-40B4-BE49-F238E27FC236}">
+                <a16:creationId xmlns:a16="http://schemas.microsoft.com/office/drawing/2014/main" id="{3BE839E4-A1D7-6647-AA21-48B34307260B}"/>
+              </a:ext>
+            </a:extLst>
+          </p:cNvPr>
+          <p:cNvSpPr/>
+          <p:nvPr/>
+        </p:nvSpPr>
+        <p:spPr>
+          <a:xfrm>
+            <a:off x="7164411" y="2484180"/>
+            <a:ext cx="1019175" cy="841248"/>
+          </a:xfrm>
+          <a:prstGeom prst="flowChartDocument">
+            <a:avLst/>
+          </a:prstGeom>
+          <a:noFill/>
+          <a:ln>
+            <a:solidFill>
+              <a:schemeClr val="tx1"/>
+            </a:solidFill>
+          </a:ln>
+        </p:spPr>
+        <p:style>
+          <a:lnRef idx="2">
+            <a:schemeClr val="accent1">
+              <a:shade val="50000"/>
+            </a:schemeClr>
+          </a:lnRef>
+          <a:fillRef idx="1">
+            <a:schemeClr val="accent1"/>
+          </a:fillRef>
+          <a:effectRef idx="0">
+            <a:schemeClr val="accent1"/>
+          </a:effectRef>
+          <a:fontRef idx="minor">
+            <a:schemeClr val="lt1"/>
+          </a:fontRef>
+        </p:style>
+        <p:txBody>
+          <a:bodyPr rot="0" spcFirstLastPara="0" vertOverflow="overflow" horzOverflow="overflow" vert="horz" wrap="square" lIns="91440" tIns="45720" rIns="91440" bIns="45720" numCol="1" spcCol="0" rtlCol="0" fromWordArt="0" anchor="ctr" anchorCtr="0" forceAA="0" compatLnSpc="1">
+            <a:prstTxWarp prst="textNoShape">
+              <a:avLst/>
+            </a:prstTxWarp>
+            <a:noAutofit/>
+          </a:bodyPr>
+          <a:lstStyle/>
+          <a:p>
+            <a:pPr algn="ctr"/>
+            <a:r>
+              <a:rPr lang="en-US" dirty="0">
+                <a:solidFill>
+                  <a:schemeClr val="tx1"/>
+                </a:solidFill>
+              </a:rPr>
+              <a:t>ID CSV</a:t>
+            </a:r>
+          </a:p>
+        </p:txBody>
+      </p:sp>
+      <p:cxnSp>
+        <p:nvCxnSpPr>
+          <p:cNvPr id="50" name="Straight Arrow Connector 49">
+            <a:extLst>
+              <a:ext uri="{FF2B5EF4-FFF2-40B4-BE49-F238E27FC236}">
+                <a16:creationId xmlns:a16="http://schemas.microsoft.com/office/drawing/2014/main" id="{465AC8FA-2113-7848-A036-61445348712F}"/>
+              </a:ext>
+            </a:extLst>
+          </p:cNvPr>
+          <p:cNvCxnSpPr>
+            <a:cxnSpLocks/>
+            <a:stCxn id="19" idx="2"/>
+            <a:endCxn id="49" idx="0"/>
+          </p:cNvCxnSpPr>
+          <p:nvPr/>
+        </p:nvCxnSpPr>
+        <p:spPr>
+          <a:xfrm>
+            <a:off x="7673999" y="2191427"/>
+            <a:ext cx="0" cy="292753"/>
+          </a:xfrm>
+          <a:prstGeom prst="straightConnector1">
+            <a:avLst/>
+          </a:prstGeom>
+          <a:ln w="19050">
+            <a:solidFill>
+              <a:schemeClr val="tx1"/>
+            </a:solidFill>
+            <a:prstDash val="sysDot"/>
+            <a:headEnd type="diamond"/>
+            <a:tailEnd type="stealth" w="lg" len="lg"/>
+          </a:ln>
+        </p:spPr>
+        <p:style>
+          <a:lnRef idx="1">
+            <a:schemeClr val="accent1"/>
+          </a:lnRef>
+          <a:fillRef idx="0">
+            <a:schemeClr val="accent1"/>
+          </a:fillRef>
+          <a:effectRef idx="0">
+            <a:schemeClr val="accent1"/>
+          </a:effectRef>
+          <a:fontRef idx="minor">
+            <a:schemeClr val="tx1"/>
+          </a:fontRef>
+        </p:style>
+      </p:cxnSp>
+      <p:sp>
+        <p:nvSpPr>
+          <p:cNvPr id="59" name="Parallelogram 58">
+            <a:extLst>
+              <a:ext uri="{FF2B5EF4-FFF2-40B4-BE49-F238E27FC236}">
+                <a16:creationId xmlns:a16="http://schemas.microsoft.com/office/drawing/2014/main" id="{923FEB54-BA6C-0649-AF6D-411499C2C495}"/>
+              </a:ext>
+            </a:extLst>
+          </p:cNvPr>
+          <p:cNvSpPr/>
+          <p:nvPr/>
+        </p:nvSpPr>
+        <p:spPr>
+          <a:xfrm>
+            <a:off x="6790862" y="3789365"/>
+            <a:ext cx="1766271" cy="1353229"/>
+          </a:xfrm>
+          <a:prstGeom prst="parallelogram">
+            <a:avLst/>
+          </a:prstGeom>
+          <a:noFill/>
+          <a:ln>
+            <a:solidFill>
+              <a:schemeClr val="tx1"/>
+            </a:solidFill>
+          </a:ln>
+        </p:spPr>
+        <p:style>
+          <a:lnRef idx="2">
+            <a:schemeClr val="accent1">
+              <a:shade val="50000"/>
+            </a:schemeClr>
+          </a:lnRef>
+          <a:fillRef idx="1">
+            <a:schemeClr val="accent1"/>
+          </a:fillRef>
+          <a:effectRef idx="0">
+            <a:schemeClr val="accent1"/>
+          </a:effectRef>
+          <a:fontRef idx="minor">
+            <a:schemeClr val="lt1"/>
+          </a:fontRef>
+        </p:style>
+        <p:txBody>
+          <a:bodyPr rot="0" spcFirstLastPara="0" vertOverflow="overflow" horzOverflow="overflow" vert="horz" wrap="square" lIns="91440" tIns="45720" rIns="91440" bIns="45720" numCol="1" spcCol="0" rtlCol="0" fromWordArt="0" anchor="ctr" anchorCtr="0" forceAA="0" compatLnSpc="1">
+            <a:prstTxWarp prst="textNoShape">
+              <a:avLst/>
+            </a:prstTxWarp>
+            <a:noAutofit/>
+          </a:bodyPr>
+          <a:lstStyle/>
+          <a:p>
+            <a:pPr algn="ctr"/>
+            <a:r>
+              <a:rPr lang="en-US" dirty="0">
+                <a:solidFill>
+                  <a:schemeClr val="tx1"/>
+                </a:solidFill>
+              </a:rPr>
+              <a:t>Query AMR Genotypes</a:t>
+            </a:r>
+          </a:p>
+        </p:txBody>
+      </p:sp>
+      <p:cxnSp>
+        <p:nvCxnSpPr>
+          <p:cNvPr id="60" name="Straight Arrow Connector 59">
+            <a:extLst>
+              <a:ext uri="{FF2B5EF4-FFF2-40B4-BE49-F238E27FC236}">
+                <a16:creationId xmlns:a16="http://schemas.microsoft.com/office/drawing/2014/main" id="{D3FA3703-8EB1-1443-88FE-E31C9D881722}"/>
+              </a:ext>
+            </a:extLst>
+          </p:cNvPr>
+          <p:cNvCxnSpPr>
+            <a:cxnSpLocks/>
+            <a:stCxn id="49" idx="2"/>
+            <a:endCxn id="59" idx="0"/>
+          </p:cNvCxnSpPr>
+          <p:nvPr/>
+        </p:nvCxnSpPr>
+        <p:spPr>
+          <a:xfrm flipH="1">
+            <a:off x="7673998" y="3269812"/>
+            <a:ext cx="1" cy="519553"/>
+          </a:xfrm>
+          <a:prstGeom prst="straightConnector1">
+            <a:avLst/>
+          </a:prstGeom>
+          <a:ln w="19050">
+            <a:solidFill>
+              <a:schemeClr val="tx1"/>
+            </a:solidFill>
+            <a:prstDash val="lgDashDot"/>
+            <a:headEnd type="diamond"/>
+            <a:tailEnd type="stealth" w="lg" len="lg"/>
+          </a:ln>
+        </p:spPr>
+        <p:style>
+          <a:lnRef idx="1">
+            <a:schemeClr val="accent1"/>
+          </a:lnRef>
+          <a:fillRef idx="0">
+            <a:schemeClr val="accent1"/>
+          </a:fillRef>
+          <a:effectRef idx="0">
+            <a:schemeClr val="accent1"/>
+          </a:effectRef>
+          <a:fontRef idx="minor">
+            <a:schemeClr val="tx1"/>
+          </a:fontRef>
+        </p:style>
+      </p:cxnSp>
+      <p:cxnSp>
+        <p:nvCxnSpPr>
+          <p:cNvPr id="65" name="Straight Arrow Connector 64">
+            <a:extLst>
+              <a:ext uri="{FF2B5EF4-FFF2-40B4-BE49-F238E27FC236}">
+                <a16:creationId xmlns:a16="http://schemas.microsoft.com/office/drawing/2014/main" id="{63716B32-2C53-3F49-9A5B-6BDB7809B5FC}"/>
+              </a:ext>
+            </a:extLst>
+          </p:cNvPr>
+          <p:cNvCxnSpPr>
+            <a:cxnSpLocks/>
+          </p:cNvCxnSpPr>
+          <p:nvPr/>
+        </p:nvCxnSpPr>
+        <p:spPr>
+          <a:xfrm>
+            <a:off x="8816799" y="6389131"/>
+            <a:ext cx="899487" cy="0"/>
+          </a:xfrm>
+          <a:prstGeom prst="straightConnector1">
+            <a:avLst/>
+          </a:prstGeom>
+          <a:ln w="19050">
+            <a:solidFill>
+              <a:schemeClr val="tx1"/>
+            </a:solidFill>
+            <a:prstDash val="lgDashDot"/>
+            <a:headEnd type="diamond"/>
+            <a:tailEnd type="stealth" w="lg" len="lg"/>
+          </a:ln>
+        </p:spPr>
+        <p:style>
+          <a:lnRef idx="1">
+            <a:schemeClr val="accent1"/>
+          </a:lnRef>
+          <a:fillRef idx="0">
+            <a:schemeClr val="accent1"/>
+          </a:fillRef>
+          <a:effectRef idx="0">
+            <a:schemeClr val="accent1"/>
+          </a:effectRef>
+          <a:fontRef idx="minor">
+            <a:schemeClr val="tx1"/>
+          </a:fontRef>
+        </p:style>
+      </p:cxnSp>
+      <p:sp>
+        <p:nvSpPr>
+          <p:cNvPr id="68" name="TextBox 67">
+            <a:extLst>
+              <a:ext uri="{FF2B5EF4-FFF2-40B4-BE49-F238E27FC236}">
+                <a16:creationId xmlns:a16="http://schemas.microsoft.com/office/drawing/2014/main" id="{7488771C-11BB-7F4F-8D0E-EDD0F982161F}"/>
+              </a:ext>
+            </a:extLst>
+          </p:cNvPr>
+          <p:cNvSpPr txBox="1"/>
+          <p:nvPr/>
+        </p:nvSpPr>
+        <p:spPr>
+          <a:xfrm>
+            <a:off x="8749830" y="5962647"/>
+            <a:ext cx="1033424" cy="369332"/>
+          </a:xfrm>
+          <a:prstGeom prst="rect">
+            <a:avLst/>
+          </a:prstGeom>
+          <a:noFill/>
+        </p:spPr>
+        <p:txBody>
+          <a:bodyPr wrap="none" rtlCol="0">
+            <a:spAutoFit/>
+          </a:bodyPr>
+          <a:lstStyle/>
+          <a:p>
+            <a:pPr algn="l"/>
+            <a:r>
+              <a:rPr lang="en-US" dirty="0"/>
+              <a:t>File Read</a:t>
+            </a:r>
+          </a:p>
+        </p:txBody>
+      </p:sp>
+      <p:cxnSp>
+        <p:nvCxnSpPr>
+          <p:cNvPr id="69" name="Straight Arrow Connector 68">
+            <a:extLst>
+              <a:ext uri="{FF2B5EF4-FFF2-40B4-BE49-F238E27FC236}">
+                <a16:creationId xmlns:a16="http://schemas.microsoft.com/office/drawing/2014/main" id="{A3B34BA8-6048-214F-85E6-59F9CEBB0183}"/>
+              </a:ext>
+            </a:extLst>
+          </p:cNvPr>
+          <p:cNvCxnSpPr>
+            <a:cxnSpLocks/>
+            <a:stCxn id="3" idx="2"/>
+            <a:endCxn id="59" idx="2"/>
+          </p:cNvCxnSpPr>
+          <p:nvPr/>
+        </p:nvCxnSpPr>
+        <p:spPr>
+          <a:xfrm flipH="1" flipV="1">
+            <a:off x="8387979" y="4465980"/>
+            <a:ext cx="664221" cy="1"/>
+          </a:xfrm>
+          <a:prstGeom prst="straightConnector1">
+            <a:avLst/>
+          </a:prstGeom>
+          <a:ln w="19050">
+            <a:solidFill>
+              <a:schemeClr val="tx1"/>
+            </a:solidFill>
+            <a:prstDash val="sysDash"/>
+            <a:headEnd type="oval"/>
+            <a:tailEnd type="triangle"/>
+          </a:ln>
+        </p:spPr>
+        <p:style>
+          <a:lnRef idx="1">
+            <a:schemeClr val="accent1"/>
+          </a:lnRef>
+          <a:fillRef idx="0">
+            <a:schemeClr val="accent1"/>
+          </a:fillRef>
+          <a:effectRef idx="0">
+            <a:schemeClr val="accent1"/>
+          </a:effectRef>
+          <a:fontRef idx="minor">
+            <a:schemeClr val="tx1"/>
+          </a:fontRef>
+        </p:style>
+      </p:cxnSp>
+      <p:cxnSp>
+        <p:nvCxnSpPr>
+          <p:cNvPr id="73" name="Straight Arrow Connector 72">
+            <a:extLst>
+              <a:ext uri="{FF2B5EF4-FFF2-40B4-BE49-F238E27FC236}">
+                <a16:creationId xmlns:a16="http://schemas.microsoft.com/office/drawing/2014/main" id="{0878BE5B-4826-B746-AFAF-8FA43D8D4E91}"/>
+              </a:ext>
+            </a:extLst>
+          </p:cNvPr>
+          <p:cNvCxnSpPr>
+            <a:cxnSpLocks/>
+          </p:cNvCxnSpPr>
+          <p:nvPr/>
+        </p:nvCxnSpPr>
+        <p:spPr>
+          <a:xfrm flipV="1">
+            <a:off x="9888360" y="6389131"/>
+            <a:ext cx="899487" cy="1446"/>
+          </a:xfrm>
+          <a:prstGeom prst="straightConnector1">
+            <a:avLst/>
+          </a:prstGeom>
+          <a:ln w="19050">
+            <a:solidFill>
+              <a:schemeClr val="tx1"/>
+            </a:solidFill>
+            <a:prstDash val="sysDash"/>
+            <a:headEnd type="oval"/>
+            <a:tailEnd type="triangle"/>
+          </a:ln>
+        </p:spPr>
+        <p:style>
+          <a:lnRef idx="1">
+            <a:schemeClr val="accent1"/>
+          </a:lnRef>
+          <a:fillRef idx="0">
+            <a:schemeClr val="accent1"/>
+          </a:fillRef>
+          <a:effectRef idx="0">
+            <a:schemeClr val="accent1"/>
+          </a:effectRef>
+          <a:fontRef idx="minor">
+            <a:schemeClr val="tx1"/>
+          </a:fontRef>
+        </p:style>
+      </p:cxnSp>
+      <p:sp>
+        <p:nvSpPr>
+          <p:cNvPr id="76" name="TextBox 75">
+            <a:extLst>
+              <a:ext uri="{FF2B5EF4-FFF2-40B4-BE49-F238E27FC236}">
+                <a16:creationId xmlns:a16="http://schemas.microsoft.com/office/drawing/2014/main" id="{B8760994-3EDF-8541-9FAD-7D25F2A13677}"/>
+              </a:ext>
+            </a:extLst>
+          </p:cNvPr>
+          <p:cNvSpPr txBox="1"/>
+          <p:nvPr/>
+        </p:nvSpPr>
+        <p:spPr>
+          <a:xfrm>
+            <a:off x="9744446" y="5961338"/>
+            <a:ext cx="1187313" cy="369332"/>
+          </a:xfrm>
+          <a:prstGeom prst="rect">
+            <a:avLst/>
+          </a:prstGeom>
+          <a:noFill/>
+        </p:spPr>
+        <p:txBody>
+          <a:bodyPr wrap="none" rtlCol="0">
+            <a:spAutoFit/>
+          </a:bodyPr>
+          <a:lstStyle/>
+          <a:p>
+            <a:pPr algn="l"/>
+            <a:r>
+              <a:rPr lang="en-US" dirty="0"/>
+              <a:t>JSON Read</a:t>
+            </a:r>
+          </a:p>
+        </p:txBody>
+      </p:sp>
+      <p:cxnSp>
+        <p:nvCxnSpPr>
+          <p:cNvPr id="78" name="Straight Arrow Connector 77">
+            <a:extLst>
+              <a:ext uri="{FF2B5EF4-FFF2-40B4-BE49-F238E27FC236}">
+                <a16:creationId xmlns:a16="http://schemas.microsoft.com/office/drawing/2014/main" id="{7222EBCF-45E4-8349-ACA9-12C2C1EAEEE3}"/>
+              </a:ext>
+            </a:extLst>
+          </p:cNvPr>
+          <p:cNvCxnSpPr>
+            <a:cxnSpLocks/>
+            <a:stCxn id="59" idx="5"/>
+            <a:endCxn id="86" idx="2"/>
+          </p:cNvCxnSpPr>
+          <p:nvPr/>
+        </p:nvCxnSpPr>
+        <p:spPr>
+          <a:xfrm flipH="1">
+            <a:off x="6181914" y="4465980"/>
+            <a:ext cx="778102" cy="1"/>
+          </a:xfrm>
+          <a:prstGeom prst="straightConnector1">
+            <a:avLst/>
+          </a:prstGeom>
+          <a:ln w="19050">
+            <a:solidFill>
+              <a:schemeClr val="tx1"/>
+            </a:solidFill>
+            <a:headEnd type="oval"/>
+            <a:tailEnd type="arrow" w="lg" len="lg"/>
+          </a:ln>
+        </p:spPr>
+        <p:style>
+          <a:lnRef idx="1">
+            <a:schemeClr val="accent1"/>
+          </a:lnRef>
+          <a:fillRef idx="0">
+            <a:schemeClr val="accent1"/>
+          </a:fillRef>
+          <a:effectRef idx="0">
+            <a:schemeClr val="accent1"/>
+          </a:effectRef>
+          <a:fontRef idx="minor">
+            <a:schemeClr val="tx1"/>
+          </a:fontRef>
+        </p:style>
+      </p:cxnSp>
+      <p:cxnSp>
+        <p:nvCxnSpPr>
+          <p:cNvPr id="81" name="Straight Arrow Connector 80">
+            <a:extLst>
+              <a:ext uri="{FF2B5EF4-FFF2-40B4-BE49-F238E27FC236}">
+                <a16:creationId xmlns:a16="http://schemas.microsoft.com/office/drawing/2014/main" id="{E15E2E4E-8072-3442-A85A-23E9CBC1AB74}"/>
+              </a:ext>
+            </a:extLst>
+          </p:cNvPr>
+          <p:cNvCxnSpPr>
+            <a:cxnSpLocks/>
+          </p:cNvCxnSpPr>
+          <p:nvPr/>
+        </p:nvCxnSpPr>
+        <p:spPr>
+          <a:xfrm flipV="1">
+            <a:off x="10958667" y="6387821"/>
+            <a:ext cx="920847" cy="1"/>
+          </a:xfrm>
+          <a:prstGeom prst="straightConnector1">
+            <a:avLst/>
+          </a:prstGeom>
+          <a:ln w="19050">
+            <a:solidFill>
+              <a:schemeClr val="tx1"/>
+            </a:solidFill>
+            <a:headEnd type="oval"/>
+            <a:tailEnd type="arrow" w="lg" len="lg"/>
+          </a:ln>
+        </p:spPr>
+        <p:style>
+          <a:lnRef idx="1">
+            <a:schemeClr val="accent1"/>
+          </a:lnRef>
+          <a:fillRef idx="0">
+            <a:schemeClr val="accent1"/>
+          </a:fillRef>
+          <a:effectRef idx="0">
+            <a:schemeClr val="accent1"/>
+          </a:effectRef>
+          <a:fontRef idx="minor">
+            <a:schemeClr val="tx1"/>
+          </a:fontRef>
+        </p:style>
+      </p:cxnSp>
+      <p:sp>
+        <p:nvSpPr>
+          <p:cNvPr id="84" name="TextBox 83">
+            <a:extLst>
+              <a:ext uri="{FF2B5EF4-FFF2-40B4-BE49-F238E27FC236}">
+                <a16:creationId xmlns:a16="http://schemas.microsoft.com/office/drawing/2014/main" id="{ECE2C2A2-3133-BA48-AE3A-6110C3EBDF42}"/>
+              </a:ext>
+            </a:extLst>
+          </p:cNvPr>
+          <p:cNvSpPr txBox="1"/>
+          <p:nvPr/>
+        </p:nvSpPr>
+        <p:spPr>
+          <a:xfrm>
+            <a:off x="10971948" y="5822838"/>
+            <a:ext cx="894284" cy="646331"/>
+          </a:xfrm>
+          <a:prstGeom prst="rect">
+            <a:avLst/>
+          </a:prstGeom>
+          <a:noFill/>
+        </p:spPr>
+        <p:txBody>
+          <a:bodyPr wrap="none" rtlCol="0">
+            <a:spAutoFit/>
+          </a:bodyPr>
+          <a:lstStyle/>
+          <a:p>
+            <a:pPr algn="ctr"/>
+            <a:r>
+              <a:rPr lang="en-US" dirty="0"/>
+              <a:t>Process</a:t>
+            </a:r>
+          </a:p>
+          <a:p>
+            <a:pPr algn="ctr"/>
+            <a:r>
+              <a:rPr lang="en-US" dirty="0"/>
+              <a:t>Flow</a:t>
+            </a:r>
+          </a:p>
+        </p:txBody>
+      </p:sp>
+      <p:sp>
+        <p:nvSpPr>
+          <p:cNvPr id="85" name="Parallelogram 84">
+            <a:extLst>
+              <a:ext uri="{FF2B5EF4-FFF2-40B4-BE49-F238E27FC236}">
+                <a16:creationId xmlns:a16="http://schemas.microsoft.com/office/drawing/2014/main" id="{422DBF3A-B753-FF48-93F1-0DEF5D6DFD62}"/>
+              </a:ext>
+            </a:extLst>
+          </p:cNvPr>
+          <p:cNvSpPr/>
+          <p:nvPr/>
+        </p:nvSpPr>
+        <p:spPr>
+          <a:xfrm>
+            <a:off x="7293506" y="5934391"/>
+            <a:ext cx="1466037" cy="644568"/>
+          </a:xfrm>
+          <a:prstGeom prst="parallelogram">
+            <a:avLst/>
+          </a:prstGeom>
+          <a:noFill/>
+          <a:ln>
+            <a:solidFill>
+              <a:schemeClr val="tx1"/>
+            </a:solidFill>
+          </a:ln>
+        </p:spPr>
+        <p:style>
+          <a:lnRef idx="2">
+            <a:schemeClr val="accent1">
+              <a:shade val="50000"/>
+            </a:schemeClr>
+          </a:lnRef>
+          <a:fillRef idx="1">
+            <a:schemeClr val="accent1"/>
+          </a:fillRef>
+          <a:effectRef idx="0">
+            <a:schemeClr val="accent1"/>
+          </a:effectRef>
+          <a:fontRef idx="minor">
+            <a:schemeClr val="lt1"/>
+          </a:fontRef>
+        </p:style>
+        <p:txBody>
+          <a:bodyPr rot="0" spcFirstLastPara="0" vertOverflow="overflow" horzOverflow="overflow" vert="horz" wrap="square" lIns="91440" tIns="45720" rIns="91440" bIns="45720" numCol="1" spcCol="0" rtlCol="0" fromWordArt="0" anchor="ctr" anchorCtr="0" forceAA="0" compatLnSpc="1">
+            <a:prstTxWarp prst="textNoShape">
+              <a:avLst/>
+            </a:prstTxWarp>
+            <a:noAutofit/>
+          </a:bodyPr>
+          <a:lstStyle/>
+          <a:p>
+            <a:pPr algn="ctr"/>
+            <a:r>
+              <a:rPr lang="en-US" dirty="0">
+                <a:solidFill>
+                  <a:schemeClr val="tx1"/>
+                </a:solidFill>
+              </a:rPr>
+              <a:t>Process</a:t>
+            </a:r>
+          </a:p>
+        </p:txBody>
+      </p:sp>
+      <p:sp>
+        <p:nvSpPr>
+          <p:cNvPr id="86" name="Parallelogram 85">
+            <a:extLst>
+              <a:ext uri="{FF2B5EF4-FFF2-40B4-BE49-F238E27FC236}">
+                <a16:creationId xmlns:a16="http://schemas.microsoft.com/office/drawing/2014/main" id="{57EB0F0D-9441-B94A-8D2F-D4B2CEA3B54B}"/>
+              </a:ext>
+            </a:extLst>
+          </p:cNvPr>
+          <p:cNvSpPr/>
+          <p:nvPr/>
+        </p:nvSpPr>
+        <p:spPr>
+          <a:xfrm>
+            <a:off x="4584797" y="3789366"/>
+            <a:ext cx="1766271" cy="1353229"/>
+          </a:xfrm>
+          <a:prstGeom prst="parallelogram">
+            <a:avLst/>
+          </a:prstGeom>
+          <a:noFill/>
+          <a:ln>
+            <a:solidFill>
+              <a:schemeClr val="tx1"/>
+            </a:solidFill>
+          </a:ln>
+        </p:spPr>
+        <p:style>
+          <a:lnRef idx="2">
+            <a:schemeClr val="accent1">
+              <a:shade val="50000"/>
+            </a:schemeClr>
+          </a:lnRef>
+          <a:fillRef idx="1">
+            <a:schemeClr val="accent1"/>
+          </a:fillRef>
+          <a:effectRef idx="0">
+            <a:schemeClr val="accent1"/>
+          </a:effectRef>
+          <a:fontRef idx="minor">
+            <a:schemeClr val="lt1"/>
+          </a:fontRef>
+        </p:style>
+        <p:txBody>
+          <a:bodyPr rot="0" spcFirstLastPara="0" vertOverflow="overflow" horzOverflow="overflow" vert="horz" wrap="square" lIns="91440" tIns="45720" rIns="91440" bIns="45720" numCol="1" spcCol="0" rtlCol="0" fromWordArt="0" anchor="ctr" anchorCtr="0" forceAA="0" compatLnSpc="1">
+            <a:prstTxWarp prst="textNoShape">
+              <a:avLst/>
+            </a:prstTxWarp>
+            <a:noAutofit/>
+          </a:bodyPr>
+          <a:lstStyle/>
+          <a:p>
+            <a:pPr algn="ctr"/>
+            <a:r>
+              <a:rPr lang="en-US" dirty="0">
+                <a:solidFill>
+                  <a:schemeClr val="tx1"/>
+                </a:solidFill>
+              </a:rPr>
+              <a:t>Generate TNT AMR Presence-Absence</a:t>
+            </a:r>
+          </a:p>
+          <a:p>
+            <a:pPr algn="ctr"/>
+            <a:r>
+              <a:rPr lang="en-US" dirty="0">
+                <a:solidFill>
+                  <a:schemeClr val="tx1"/>
+                </a:solidFill>
+              </a:rPr>
+              <a:t>Matrix</a:t>
+            </a:r>
+          </a:p>
+        </p:txBody>
+      </p:sp>
+      <p:sp>
+        <p:nvSpPr>
+          <p:cNvPr id="94" name="Document 93">
+            <a:extLst>
+              <a:ext uri="{FF2B5EF4-FFF2-40B4-BE49-F238E27FC236}">
+                <a16:creationId xmlns:a16="http://schemas.microsoft.com/office/drawing/2014/main" id="{C76C59EA-CD70-994B-AE50-B1935F7BBD07}"/>
+              </a:ext>
+            </a:extLst>
+          </p:cNvPr>
+          <p:cNvSpPr/>
+          <p:nvPr/>
+        </p:nvSpPr>
+        <p:spPr>
+          <a:xfrm>
+            <a:off x="1083183" y="3796943"/>
+            <a:ext cx="1764792" cy="1353229"/>
+          </a:xfrm>
+          <a:prstGeom prst="flowChartInputOutput">
+            <a:avLst/>
+          </a:prstGeom>
+          <a:noFill/>
+          <a:ln>
+            <a:solidFill>
+              <a:schemeClr val="tx1"/>
+            </a:solidFill>
+          </a:ln>
+        </p:spPr>
+        <p:style>
+          <a:lnRef idx="2">
+            <a:schemeClr val="accent1">
+              <a:shade val="50000"/>
+            </a:schemeClr>
+          </a:lnRef>
+          <a:fillRef idx="1">
+            <a:schemeClr val="accent1"/>
+          </a:fillRef>
+          <a:effectRef idx="0">
+            <a:schemeClr val="accent1"/>
+          </a:effectRef>
+          <a:fontRef idx="minor">
+            <a:schemeClr val="lt1"/>
+          </a:fontRef>
+        </p:style>
+        <p:txBody>
+          <a:bodyPr rot="0" spcFirstLastPara="0" vertOverflow="overflow" horzOverflow="overflow" vert="horz" wrap="square" lIns="91440" tIns="45720" rIns="91440" bIns="45720" numCol="1" spcCol="0" rtlCol="0" fromWordArt="0" anchor="ctr" anchorCtr="0" forceAA="0" compatLnSpc="1">
+            <a:prstTxWarp prst="textNoShape">
+              <a:avLst/>
+            </a:prstTxWarp>
+            <a:noAutofit/>
+          </a:bodyPr>
+          <a:lstStyle/>
+          <a:p>
+            <a:pPr algn="ctr"/>
+            <a:r>
+              <a:rPr lang="en-US" dirty="0">
+                <a:solidFill>
+                  <a:schemeClr val="tx1"/>
+                </a:solidFill>
+              </a:rPr>
+              <a:t>Optimize Matrix on Tree</a:t>
+            </a:r>
+          </a:p>
+        </p:txBody>
+      </p:sp>
+      <p:cxnSp>
+        <p:nvCxnSpPr>
+          <p:cNvPr id="95" name="Straight Arrow Connector 94">
+            <a:extLst>
+              <a:ext uri="{FF2B5EF4-FFF2-40B4-BE49-F238E27FC236}">
+                <a16:creationId xmlns:a16="http://schemas.microsoft.com/office/drawing/2014/main" id="{BFC524A0-639A-3A4C-AF87-D768792112D4}"/>
+              </a:ext>
+            </a:extLst>
+          </p:cNvPr>
+          <p:cNvCxnSpPr>
+            <a:cxnSpLocks/>
+            <a:stCxn id="86" idx="5"/>
+            <a:endCxn id="74" idx="3"/>
+          </p:cNvCxnSpPr>
+          <p:nvPr/>
+        </p:nvCxnSpPr>
+        <p:spPr>
+          <a:xfrm flipH="1">
+            <a:off x="4224538" y="4465981"/>
+            <a:ext cx="529413" cy="0"/>
+          </a:xfrm>
+          <a:prstGeom prst="straightConnector1">
+            <a:avLst/>
+          </a:prstGeom>
+          <a:ln w="19050">
+            <a:solidFill>
+              <a:schemeClr val="tx1"/>
+            </a:solidFill>
+            <a:prstDash val="sysDot"/>
+            <a:headEnd type="diamond"/>
+            <a:tailEnd type="stealth" w="lg" len="lg"/>
+          </a:ln>
+        </p:spPr>
+        <p:style>
+          <a:lnRef idx="1">
+            <a:schemeClr val="accent1"/>
+          </a:lnRef>
+          <a:fillRef idx="0">
+            <a:schemeClr val="accent1"/>
+          </a:fillRef>
+          <a:effectRef idx="0">
+            <a:schemeClr val="accent1"/>
+          </a:effectRef>
+          <a:fontRef idx="minor">
+            <a:schemeClr val="tx1"/>
+          </a:fontRef>
+        </p:style>
+      </p:cxnSp>
+      <p:sp>
+        <p:nvSpPr>
+          <p:cNvPr id="98" name="Parallelogram 97">
+            <a:extLst>
+              <a:ext uri="{FF2B5EF4-FFF2-40B4-BE49-F238E27FC236}">
+                <a16:creationId xmlns:a16="http://schemas.microsoft.com/office/drawing/2014/main" id="{B05888AD-7F46-304F-94E4-6E49F6645203}"/>
+              </a:ext>
+            </a:extLst>
+          </p:cNvPr>
+          <p:cNvSpPr/>
+          <p:nvPr/>
+        </p:nvSpPr>
+        <p:spPr>
+          <a:xfrm>
+            <a:off x="4364212" y="3587745"/>
+            <a:ext cx="4452587" cy="1771626"/>
+          </a:xfrm>
+          <a:prstGeom prst="parallelogram">
+            <a:avLst/>
+          </a:prstGeom>
+          <a:noFill/>
+          <a:ln>
+            <a:solidFill>
+              <a:schemeClr val="tx1"/>
+            </a:solidFill>
+          </a:ln>
+        </p:spPr>
+        <p:style>
+          <a:lnRef idx="2">
+            <a:schemeClr val="accent1">
+              <a:shade val="50000"/>
+            </a:schemeClr>
+          </a:lnRef>
+          <a:fillRef idx="1">
+            <a:schemeClr val="accent1"/>
+          </a:fillRef>
+          <a:effectRef idx="0">
+            <a:schemeClr val="accent1"/>
+          </a:effectRef>
+          <a:fontRef idx="minor">
+            <a:schemeClr val="lt1"/>
+          </a:fontRef>
+        </p:style>
+        <p:txBody>
+          <a:bodyPr rot="0" spcFirstLastPara="0" vertOverflow="overflow" horzOverflow="overflow" vert="horz" wrap="square" lIns="91440" tIns="45720" rIns="91440" bIns="45720" numCol="1" spcCol="0" rtlCol="0" fromWordArt="0" anchor="ctr" anchorCtr="0" forceAA="0" compatLnSpc="1">
+            <a:prstTxWarp prst="textNoShape">
+              <a:avLst/>
+            </a:prstTxWarp>
+            <a:noAutofit/>
+          </a:bodyPr>
+          <a:lstStyle/>
+          <a:p>
+            <a:pPr algn="ctr"/>
+            <a:endParaRPr lang="en-US" dirty="0">
+              <a:solidFill>
+                <a:schemeClr val="tx1"/>
+              </a:solidFill>
+            </a:endParaRPr>
+          </a:p>
+        </p:txBody>
+      </p:sp>
+      <p:cxnSp>
+        <p:nvCxnSpPr>
+          <p:cNvPr id="70" name="Straight Arrow Connector 89">
+            <a:extLst>
+              <a:ext uri="{FF2B5EF4-FFF2-40B4-BE49-F238E27FC236}">
+                <a16:creationId xmlns:a16="http://schemas.microsoft.com/office/drawing/2014/main" id="{236C4C53-72E8-4BDB-8021-63A7129C8208}"/>
+              </a:ext>
+            </a:extLst>
+          </p:cNvPr>
+          <p:cNvCxnSpPr>
+            <a:cxnSpLocks/>
+            <a:stCxn id="4" idx="2"/>
+            <a:endCxn id="94" idx="0"/>
+          </p:cNvCxnSpPr>
+          <p:nvPr/>
+        </p:nvCxnSpPr>
+        <p:spPr>
+          <a:xfrm rot="5400000">
+            <a:off x="2106203" y="2048521"/>
+            <a:ext cx="1784278" cy="1712567"/>
+          </a:xfrm>
+          <a:prstGeom prst="bentConnector3">
+            <a:avLst>
+              <a:gd name="adj1" fmla="val 50000"/>
+            </a:avLst>
+          </a:prstGeom>
+          <a:ln w="19050">
+            <a:solidFill>
+              <a:schemeClr val="tx1"/>
+            </a:solidFill>
+            <a:prstDash val="lgDashDot"/>
+            <a:headEnd type="diamond"/>
+            <a:tailEnd type="stealth" w="lg" len="lg"/>
+          </a:ln>
+        </p:spPr>
+        <p:style>
+          <a:lnRef idx="1">
+            <a:schemeClr val="accent1"/>
+          </a:lnRef>
+          <a:fillRef idx="0">
+            <a:schemeClr val="accent1"/>
+          </a:fillRef>
+          <a:effectRef idx="0">
+            <a:schemeClr val="accent1"/>
+          </a:effectRef>
+          <a:fontRef idx="minor">
+            <a:schemeClr val="tx1"/>
+          </a:fontRef>
+        </p:style>
+      </p:cxnSp>
+      <p:sp>
+        <p:nvSpPr>
+          <p:cNvPr id="74" name="Document 39">
+            <a:extLst>
+              <a:ext uri="{FF2B5EF4-FFF2-40B4-BE49-F238E27FC236}">
+                <a16:creationId xmlns:a16="http://schemas.microsoft.com/office/drawing/2014/main" id="{46705ED8-70D4-43E5-9F41-A61AB6940538}"/>
+              </a:ext>
+            </a:extLst>
+          </p:cNvPr>
+          <p:cNvSpPr/>
+          <p:nvPr/>
+        </p:nvSpPr>
+        <p:spPr>
+          <a:xfrm>
+            <a:off x="3205363" y="4045357"/>
+            <a:ext cx="1019175" cy="841248"/>
+          </a:xfrm>
+          <a:prstGeom prst="flowChartDocument">
+            <a:avLst/>
+          </a:prstGeom>
+          <a:noFill/>
+          <a:ln>
+            <a:solidFill>
+              <a:schemeClr val="tx1"/>
+            </a:solidFill>
+          </a:ln>
+        </p:spPr>
+        <p:style>
+          <a:lnRef idx="2">
+            <a:schemeClr val="accent1">
+              <a:shade val="50000"/>
+            </a:schemeClr>
+          </a:lnRef>
+          <a:fillRef idx="1">
+            <a:schemeClr val="accent1"/>
+          </a:fillRef>
+          <a:effectRef idx="0">
+            <a:schemeClr val="accent1"/>
+          </a:effectRef>
+          <a:fontRef idx="minor">
+            <a:schemeClr val="lt1"/>
+          </a:fontRef>
+        </p:style>
+        <p:txBody>
+          <a:bodyPr rot="0" spcFirstLastPara="0" vertOverflow="overflow" horzOverflow="overflow" vert="horz" wrap="square" lIns="91440" tIns="45720" rIns="91440" bIns="45720" numCol="1" spcCol="0" rtlCol="0" fromWordArt="0" anchor="ctr" anchorCtr="0" forceAA="0" compatLnSpc="1">
+            <a:prstTxWarp prst="textNoShape">
+              <a:avLst/>
+            </a:prstTxWarp>
+            <a:noAutofit/>
+          </a:bodyPr>
+          <a:lstStyle/>
+          <a:p>
+            <a:pPr algn="ctr"/>
+            <a:r>
+              <a:rPr lang="en-US" dirty="0">
+                <a:solidFill>
+                  <a:schemeClr val="tx1"/>
+                </a:solidFill>
+              </a:rPr>
+              <a:t>Matrix File</a:t>
+            </a:r>
+          </a:p>
+        </p:txBody>
+      </p:sp>
+      <p:cxnSp>
+        <p:nvCxnSpPr>
+          <p:cNvPr id="83" name="Straight Arrow Connector 82">
+            <a:extLst>
+              <a:ext uri="{FF2B5EF4-FFF2-40B4-BE49-F238E27FC236}">
+                <a16:creationId xmlns:a16="http://schemas.microsoft.com/office/drawing/2014/main" id="{6B9422E7-1570-499C-9988-F319CFE3D9CC}"/>
+              </a:ext>
+            </a:extLst>
+          </p:cNvPr>
+          <p:cNvCxnSpPr>
+            <a:cxnSpLocks/>
+            <a:stCxn id="74" idx="1"/>
+            <a:endCxn id="94" idx="5"/>
+          </p:cNvCxnSpPr>
+          <p:nvPr/>
+        </p:nvCxnSpPr>
+        <p:spPr>
+          <a:xfrm flipH="1">
+            <a:off x="2671496" y="4465981"/>
+            <a:ext cx="533867" cy="7577"/>
+          </a:xfrm>
+          <a:prstGeom prst="straightConnector1">
+            <a:avLst/>
+          </a:prstGeom>
+          <a:ln w="19050">
+            <a:solidFill>
+              <a:schemeClr val="tx1"/>
+            </a:solidFill>
+            <a:prstDash val="dashDot"/>
+            <a:headEnd type="diamond"/>
+            <a:tailEnd type="stealth" w="lg" len="lg"/>
+          </a:ln>
+        </p:spPr>
+        <p:style>
+          <a:lnRef idx="1">
+            <a:schemeClr val="accent1"/>
+          </a:lnRef>
+          <a:fillRef idx="0">
+            <a:schemeClr val="accent1"/>
+          </a:fillRef>
+          <a:effectRef idx="0">
+            <a:schemeClr val="accent1"/>
+          </a:effectRef>
+          <a:fontRef idx="minor">
+            <a:schemeClr val="tx1"/>
+          </a:fontRef>
+        </p:style>
+      </p:cxnSp>
+      <p:cxnSp>
+        <p:nvCxnSpPr>
+          <p:cNvPr id="109" name="Straight Arrow Connector 108">
+            <a:extLst>
+              <a:ext uri="{FF2B5EF4-FFF2-40B4-BE49-F238E27FC236}">
+                <a16:creationId xmlns:a16="http://schemas.microsoft.com/office/drawing/2014/main" id="{D4F7D7E1-5B88-4FEA-B0B1-181417B8C455}"/>
+              </a:ext>
+            </a:extLst>
+          </p:cNvPr>
+          <p:cNvCxnSpPr>
+            <a:cxnSpLocks/>
+            <a:stCxn id="40" idx="2"/>
+            <a:endCxn id="86" idx="0"/>
+          </p:cNvCxnSpPr>
+          <p:nvPr/>
+        </p:nvCxnSpPr>
+        <p:spPr>
+          <a:xfrm>
+            <a:off x="5466739" y="3279012"/>
+            <a:ext cx="1194" cy="510354"/>
+          </a:xfrm>
+          <a:prstGeom prst="straightConnector1">
+            <a:avLst/>
+          </a:prstGeom>
+          <a:ln w="19050">
+            <a:solidFill>
+              <a:schemeClr val="tx1"/>
+            </a:solidFill>
+            <a:prstDash val="lgDashDot"/>
+            <a:headEnd type="diamond"/>
+            <a:tailEnd type="stealth" w="lg" len="lg"/>
+          </a:ln>
+        </p:spPr>
+        <p:style>
+          <a:lnRef idx="1">
+            <a:schemeClr val="accent1"/>
+          </a:lnRef>
+          <a:fillRef idx="0">
+            <a:schemeClr val="accent1"/>
+          </a:fillRef>
+          <a:effectRef idx="0">
+            <a:schemeClr val="accent1"/>
+          </a:effectRef>
+          <a:fontRef idx="minor">
+            <a:schemeClr val="tx1"/>
+          </a:fontRef>
+        </p:style>
+      </p:cxnSp>
+    </p:spTree>
+    <p:extLst>
+      <p:ext uri="{BB962C8B-B14F-4D97-AF65-F5344CB8AC3E}">
+        <p14:creationId xmlns:p14="http://schemas.microsoft.com/office/powerpoint/2010/main" val="3570568633"/>
       </p:ext>
     </p:extLst>
   </p:cSld>

</xml_diff>

<commit_message>
Update TNT process flow
</commit_message>
<xml_diff>
--- a/Genetic_Capitalism/TNT/TNTFileGenerator/TNT_file_generator.pptx
+++ b/Genetic_Capitalism/TNT/TNTFileGenerator/TNT_file_generator.pptx
@@ -9,7 +9,7 @@
     <p:sldId id="258" r:id="rId3"/>
   </p:sldIdLst>
   <p:sldSz cx="12192000" cy="6858000"/>
-  <p:notesSz cx="6858000" cy="9144000"/>
+  <p:notesSz cx="7010400" cy="9296400"/>
   <p:defaultTextStyle>
     <a:defPPr>
       <a:defRPr lang="en-US"/>
@@ -6289,118 +6289,6 @@
       </p:sp>
       <p:cxnSp>
         <p:nvCxnSpPr>
-          <p:cNvPr id="39" name="Straight Arrow Connector 38">
-            <a:extLst>
-              <a:ext uri="{FF2B5EF4-FFF2-40B4-BE49-F238E27FC236}">
-                <a16:creationId xmlns:a16="http://schemas.microsoft.com/office/drawing/2014/main" id="{180B8336-EA85-3F40-AF95-EE3B7CD0D1A3}"/>
-              </a:ext>
-            </a:extLst>
-          </p:cNvPr>
-          <p:cNvCxnSpPr>
-            <a:cxnSpLocks/>
-            <a:stCxn id="17" idx="2"/>
-            <a:endCxn id="40" idx="0"/>
-          </p:cNvCxnSpPr>
-          <p:nvPr/>
-        </p:nvCxnSpPr>
-        <p:spPr>
-          <a:xfrm>
-            <a:off x="5461367" y="2191427"/>
-            <a:ext cx="5372" cy="301953"/>
-          </a:xfrm>
-          <a:prstGeom prst="straightConnector1">
-            <a:avLst/>
-          </a:prstGeom>
-          <a:ln w="19050">
-            <a:solidFill>
-              <a:schemeClr val="tx1"/>
-            </a:solidFill>
-            <a:prstDash val="sysDot"/>
-            <a:headEnd type="diamond"/>
-            <a:tailEnd type="stealth" w="lg" len="lg"/>
-          </a:ln>
-        </p:spPr>
-        <p:style>
-          <a:lnRef idx="1">
-            <a:schemeClr val="accent1"/>
-          </a:lnRef>
-          <a:fillRef idx="0">
-            <a:schemeClr val="accent1"/>
-          </a:fillRef>
-          <a:effectRef idx="0">
-            <a:schemeClr val="accent1"/>
-          </a:effectRef>
-          <a:fontRef idx="minor">
-            <a:schemeClr val="tx1"/>
-          </a:fontRef>
-        </p:style>
-      </p:cxnSp>
-      <p:sp>
-        <p:nvSpPr>
-          <p:cNvPr id="40" name="Document 39">
-            <a:extLst>
-              <a:ext uri="{FF2B5EF4-FFF2-40B4-BE49-F238E27FC236}">
-                <a16:creationId xmlns:a16="http://schemas.microsoft.com/office/drawing/2014/main" id="{6F0A63C6-7AE2-6744-B94E-F201DEF9DF52}"/>
-              </a:ext>
-            </a:extLst>
-          </p:cNvPr>
-          <p:cNvSpPr/>
-          <p:nvPr/>
-        </p:nvSpPr>
-        <p:spPr>
-          <a:xfrm>
-            <a:off x="4957151" y="2493380"/>
-            <a:ext cx="1019175" cy="841248"/>
-          </a:xfrm>
-          <a:prstGeom prst="flowChartDocument">
-            <a:avLst/>
-          </a:prstGeom>
-          <a:noFill/>
-          <a:ln>
-            <a:solidFill>
-              <a:schemeClr val="tx1"/>
-            </a:solidFill>
-          </a:ln>
-        </p:spPr>
-        <p:style>
-          <a:lnRef idx="2">
-            <a:schemeClr val="accent1">
-              <a:shade val="50000"/>
-            </a:schemeClr>
-          </a:lnRef>
-          <a:fillRef idx="1">
-            <a:schemeClr val="accent1"/>
-          </a:fillRef>
-          <a:effectRef idx="0">
-            <a:schemeClr val="accent1"/>
-          </a:effectRef>
-          <a:fontRef idx="minor">
-            <a:schemeClr val="lt1"/>
-          </a:fontRef>
-        </p:style>
-        <p:txBody>
-          <a:bodyPr rot="0" spcFirstLastPara="0" vertOverflow="overflow" horzOverflow="overflow" vert="horz" wrap="square" lIns="91440" tIns="45720" rIns="91440" bIns="45720" numCol="1" spcCol="0" rtlCol="0" fromWordArt="0" anchor="ctr" anchorCtr="0" forceAA="0" compatLnSpc="1">
-            <a:prstTxWarp prst="textNoShape">
-              <a:avLst/>
-            </a:prstTxWarp>
-            <a:noAutofit/>
-          </a:bodyPr>
-          <a:lstStyle/>
-          <a:p>
-            <a:pPr algn="ctr"/>
-            <a:r>
-              <a:rPr lang="en-US" dirty="0">
-                <a:solidFill>
-                  <a:schemeClr val="tx1"/>
-                </a:solidFill>
-              </a:rPr>
-              <a:t>TNT File</a:t>
-            </a:r>
-          </a:p>
-        </p:txBody>
-      </p:sp>
-      <p:cxnSp>
-        <p:nvCxnSpPr>
           <p:cNvPr id="45" name="Straight Arrow Connector 44">
             <a:extLst>
               <a:ext uri="{FF2B5EF4-FFF2-40B4-BE49-F238E27FC236}">
@@ -7364,56 +7252,6 @@
           </a:p>
         </p:txBody>
       </p:sp>
-      <p:cxnSp>
-        <p:nvCxnSpPr>
-          <p:cNvPr id="70" name="Straight Arrow Connector 89">
-            <a:extLst>
-              <a:ext uri="{FF2B5EF4-FFF2-40B4-BE49-F238E27FC236}">
-                <a16:creationId xmlns:a16="http://schemas.microsoft.com/office/drawing/2014/main" id="{236C4C53-72E8-4BDB-8021-63A7129C8208}"/>
-              </a:ext>
-            </a:extLst>
-          </p:cNvPr>
-          <p:cNvCxnSpPr>
-            <a:cxnSpLocks/>
-            <a:stCxn id="4" idx="2"/>
-            <a:endCxn id="94" idx="0"/>
-          </p:cNvCxnSpPr>
-          <p:nvPr/>
-        </p:nvCxnSpPr>
-        <p:spPr>
-          <a:xfrm rot="5400000">
-            <a:off x="2106203" y="2048521"/>
-            <a:ext cx="1784278" cy="1712567"/>
-          </a:xfrm>
-          <a:prstGeom prst="bentConnector3">
-            <a:avLst>
-              <a:gd name="adj1" fmla="val 50000"/>
-            </a:avLst>
-          </a:prstGeom>
-          <a:ln w="19050">
-            <a:solidFill>
-              <a:schemeClr val="tx1"/>
-            </a:solidFill>
-            <a:prstDash val="lgDashDot"/>
-            <a:headEnd type="diamond"/>
-            <a:tailEnd type="stealth" w="lg" len="lg"/>
-          </a:ln>
-        </p:spPr>
-        <p:style>
-          <a:lnRef idx="1">
-            <a:schemeClr val="accent1"/>
-          </a:lnRef>
-          <a:fillRef idx="0">
-            <a:schemeClr val="accent1"/>
-          </a:fillRef>
-          <a:effectRef idx="0">
-            <a:schemeClr val="accent1"/>
-          </a:effectRef>
-          <a:fontRef idx="minor">
-            <a:schemeClr val="tx1"/>
-          </a:fontRef>
-        </p:style>
-      </p:cxnSp>
       <p:sp>
         <p:nvSpPr>
           <p:cNvPr id="74" name="Document 39">
@@ -7473,7 +7311,7 @@
                   <a:schemeClr val="tx1"/>
                 </a:solidFill>
               </a:rPr>
-              <a:t>Matrix File</a:t>
+              <a:t>TNT File</a:t>
             </a:r>
           </a:p>
         </p:txBody>
@@ -7528,27 +7366,29 @@
       </p:cxnSp>
       <p:cxnSp>
         <p:nvCxnSpPr>
-          <p:cNvPr id="109" name="Straight Arrow Connector 108">
-            <a:extLst>
-              <a:ext uri="{FF2B5EF4-FFF2-40B4-BE49-F238E27FC236}">
-                <a16:creationId xmlns:a16="http://schemas.microsoft.com/office/drawing/2014/main" id="{D4F7D7E1-5B88-4FEA-B0B1-181417B8C455}"/>
+          <p:cNvPr id="46" name="Straight Arrow Connector 89">
+            <a:extLst>
+              <a:ext uri="{FF2B5EF4-FFF2-40B4-BE49-F238E27FC236}">
+                <a16:creationId xmlns:a16="http://schemas.microsoft.com/office/drawing/2014/main" id="{F38AEFF9-D6E0-4898-8738-6E3950FA66EA}"/>
               </a:ext>
             </a:extLst>
           </p:cNvPr>
           <p:cNvCxnSpPr>
             <a:cxnSpLocks/>
-            <a:stCxn id="40" idx="2"/>
-            <a:endCxn id="86" idx="0"/>
+            <a:stCxn id="4" idx="2"/>
+            <a:endCxn id="94" idx="0"/>
           </p:cNvCxnSpPr>
           <p:nvPr/>
         </p:nvCxnSpPr>
         <p:spPr>
-          <a:xfrm>
-            <a:off x="5466739" y="3279012"/>
-            <a:ext cx="1194" cy="510354"/>
-          </a:xfrm>
-          <a:prstGeom prst="straightConnector1">
-            <a:avLst/>
+          <a:xfrm rot="5400000">
+            <a:off x="2106203" y="2048521"/>
+            <a:ext cx="1784278" cy="1712567"/>
+          </a:xfrm>
+          <a:prstGeom prst="bentConnector3">
+            <a:avLst>
+              <a:gd name="adj1" fmla="val 50000"/>
+            </a:avLst>
           </a:prstGeom>
           <a:ln w="19050">
             <a:solidFill>

</xml_diff>